<commit_message>
Add logos to last slide of pptx
</commit_message>
<xml_diff>
--- a/documentation/stocksim_preliminary_presentation.pptx
+++ b/documentation/stocksim_preliminary_presentation.pptx
@@ -112,6 +112,11 @@
       </a:defRPr>
     </a:lvl9pPr>
   </p:defaultTextStyle>
+  <p:extLst>
+    <p:ext uri="{EFAFB233-063F-42B5-8137-9DF3F51BA10A}">
+      <p15:sldGuideLst xmlns:p15="http://schemas.microsoft.com/office/powerpoint/2012/main"/>
+    </p:ext>
+  </p:extLst>
 </p:presentation>
 </file>
 
@@ -4406,16 +4411,186 @@
               <a:buChar char=""/>
             </a:pPr>
             <a:r>
-              <a:rPr lang="it-IT" sz="1800" b="0" strike="noStrike" spc="-1">
-                <a:solidFill>
-                  <a:srgbClr val="000000"/>
-                </a:solidFill>
-                <a:latin typeface="Arial"/>
-                <a:ea typeface="DejaVu Sans"/>
-              </a:rPr>
-              <a:t>StockSim is a Java Application which allows users to simulate stock portfolios using statistical models built using NASDAQ historical data.</a:t>
-            </a:r>
-            <a:endParaRPr lang="it-IT" sz="1800" b="0" strike="noStrike" spc="-1">
+              <a:rPr lang="it-IT" sz="1800" b="0" strike="noStrike" spc="-1" dirty="0" err="1">
+                <a:solidFill>
+                  <a:srgbClr val="000000"/>
+                </a:solidFill>
+                <a:latin typeface="Arial"/>
+                <a:ea typeface="DejaVu Sans"/>
+              </a:rPr>
+              <a:t>StockSim</a:t>
+            </a:r>
+            <a:r>
+              <a:rPr lang="it-IT" sz="1800" b="0" strike="noStrike" spc="-1" dirty="0">
+                <a:solidFill>
+                  <a:srgbClr val="000000"/>
+                </a:solidFill>
+                <a:latin typeface="Arial"/>
+                <a:ea typeface="DejaVu Sans"/>
+              </a:rPr>
+              <a:t> </a:t>
+            </a:r>
+            <a:r>
+              <a:rPr lang="it-IT" sz="1800" b="0" strike="noStrike" spc="-1" dirty="0" err="1">
+                <a:solidFill>
+                  <a:srgbClr val="000000"/>
+                </a:solidFill>
+                <a:latin typeface="Arial"/>
+                <a:ea typeface="DejaVu Sans"/>
+              </a:rPr>
+              <a:t>is</a:t>
+            </a:r>
+            <a:r>
+              <a:rPr lang="it-IT" sz="1800" b="0" strike="noStrike" spc="-1" dirty="0">
+                <a:solidFill>
+                  <a:srgbClr val="000000"/>
+                </a:solidFill>
+                <a:latin typeface="Arial"/>
+                <a:ea typeface="DejaVu Sans"/>
+              </a:rPr>
+              <a:t> a Java Application </a:t>
+            </a:r>
+            <a:r>
+              <a:rPr lang="it-IT" sz="1800" b="0" strike="noStrike" spc="-1" dirty="0" err="1">
+                <a:solidFill>
+                  <a:srgbClr val="000000"/>
+                </a:solidFill>
+                <a:latin typeface="Arial"/>
+                <a:ea typeface="DejaVu Sans"/>
+              </a:rPr>
+              <a:t>which</a:t>
+            </a:r>
+            <a:r>
+              <a:rPr lang="it-IT" sz="1800" b="0" strike="noStrike" spc="-1" dirty="0">
+                <a:solidFill>
+                  <a:srgbClr val="000000"/>
+                </a:solidFill>
+                <a:latin typeface="Arial"/>
+                <a:ea typeface="DejaVu Sans"/>
+              </a:rPr>
+              <a:t> </a:t>
+            </a:r>
+            <a:r>
+              <a:rPr lang="it-IT" sz="1800" b="0" strike="noStrike" spc="-1" dirty="0" err="1">
+                <a:solidFill>
+                  <a:srgbClr val="000000"/>
+                </a:solidFill>
+                <a:latin typeface="Arial"/>
+                <a:ea typeface="DejaVu Sans"/>
+              </a:rPr>
+              <a:t>allows</a:t>
+            </a:r>
+            <a:r>
+              <a:rPr lang="it-IT" sz="1800" b="0" strike="noStrike" spc="-1" dirty="0">
+                <a:solidFill>
+                  <a:srgbClr val="000000"/>
+                </a:solidFill>
+                <a:latin typeface="Arial"/>
+                <a:ea typeface="DejaVu Sans"/>
+              </a:rPr>
+              <a:t> users to simulate stock portfolios </a:t>
+            </a:r>
+            <a:r>
+              <a:rPr lang="it-IT" sz="1800" b="0" strike="noStrike" spc="-1" dirty="0" err="1">
+                <a:solidFill>
+                  <a:srgbClr val="000000"/>
+                </a:solidFill>
+                <a:latin typeface="Arial"/>
+                <a:ea typeface="DejaVu Sans"/>
+              </a:rPr>
+              <a:t>using</a:t>
+            </a:r>
+            <a:r>
+              <a:rPr lang="it-IT" sz="1800" b="0" strike="noStrike" spc="-1" dirty="0">
+                <a:solidFill>
+                  <a:srgbClr val="000000"/>
+                </a:solidFill>
+                <a:latin typeface="Arial"/>
+                <a:ea typeface="DejaVu Sans"/>
+              </a:rPr>
+              <a:t> </a:t>
+            </a:r>
+            <a:r>
+              <a:rPr lang="it-IT" sz="1800" b="0" strike="noStrike" spc="-1" dirty="0" err="1">
+                <a:solidFill>
+                  <a:srgbClr val="000000"/>
+                </a:solidFill>
+                <a:latin typeface="Arial"/>
+                <a:ea typeface="DejaVu Sans"/>
+              </a:rPr>
+              <a:t>statistical</a:t>
+            </a:r>
+            <a:r>
+              <a:rPr lang="it-IT" sz="1800" b="0" strike="noStrike" spc="-1" dirty="0">
+                <a:solidFill>
+                  <a:srgbClr val="000000"/>
+                </a:solidFill>
+                <a:latin typeface="Arial"/>
+                <a:ea typeface="DejaVu Sans"/>
+              </a:rPr>
+              <a:t> models </a:t>
+            </a:r>
+            <a:r>
+              <a:rPr lang="it-IT" sz="1800" b="0" strike="noStrike" spc="-1" dirty="0" err="1">
+                <a:solidFill>
+                  <a:srgbClr val="000000"/>
+                </a:solidFill>
+                <a:latin typeface="Arial"/>
+                <a:ea typeface="DejaVu Sans"/>
+              </a:rPr>
+              <a:t>built</a:t>
+            </a:r>
+            <a:r>
+              <a:rPr lang="it-IT" sz="1800" b="0" strike="noStrike" spc="-1" dirty="0">
+                <a:solidFill>
+                  <a:srgbClr val="000000"/>
+                </a:solidFill>
+                <a:latin typeface="Arial"/>
+                <a:ea typeface="DejaVu Sans"/>
+              </a:rPr>
+              <a:t> </a:t>
+            </a:r>
+            <a:r>
+              <a:rPr lang="it-IT" sz="1800" b="0" strike="noStrike" spc="-1" dirty="0" err="1">
+                <a:solidFill>
+                  <a:srgbClr val="000000"/>
+                </a:solidFill>
+                <a:latin typeface="Arial"/>
+                <a:ea typeface="DejaVu Sans"/>
+              </a:rPr>
+              <a:t>using</a:t>
+            </a:r>
+            <a:r>
+              <a:rPr lang="it-IT" sz="1800" b="0" strike="noStrike" spc="-1" dirty="0">
+                <a:solidFill>
+                  <a:srgbClr val="000000"/>
+                </a:solidFill>
+                <a:latin typeface="Arial"/>
+                <a:ea typeface="DejaVu Sans"/>
+              </a:rPr>
+              <a:t> NASDAQ </a:t>
+            </a:r>
+            <a:r>
+              <a:rPr lang="it-IT" sz="1800" b="0" strike="noStrike" spc="-1" dirty="0" err="1">
+                <a:solidFill>
+                  <a:srgbClr val="000000"/>
+                </a:solidFill>
+                <a:latin typeface="Arial"/>
+                <a:ea typeface="DejaVu Sans"/>
+              </a:rPr>
+              <a:t>historical</a:t>
+            </a:r>
+            <a:r>
+              <a:rPr lang="it-IT" sz="1800" b="0" strike="noStrike" spc="-1" dirty="0">
+                <a:solidFill>
+                  <a:srgbClr val="000000"/>
+                </a:solidFill>
+                <a:latin typeface="Arial"/>
+                <a:ea typeface="DejaVu Sans"/>
+              </a:rPr>
+              <a:t> data.</a:t>
+            </a:r>
+            <a:endParaRPr lang="it-IT" sz="1800" b="0" strike="noStrike" spc="-1" dirty="0">
               <a:latin typeface="Arial"/>
             </a:endParaRPr>
           </a:p>
@@ -4431,16 +4606,56 @@
               <a:buChar char=""/>
             </a:pPr>
             <a:r>
-              <a:rPr lang="it-IT" sz="1800" b="0" strike="noStrike" spc="-1">
-                <a:solidFill>
-                  <a:srgbClr val="000000"/>
-                </a:solidFill>
-                <a:latin typeface="Arial"/>
-                <a:ea typeface="DejaVu Sans"/>
-              </a:rPr>
-              <a:t>Users can sign up and sign in.</a:t>
-            </a:r>
-            <a:endParaRPr lang="it-IT" sz="1800" b="0" strike="noStrike" spc="-1">
+              <a:rPr lang="it-IT" sz="1800" b="0" strike="noStrike" spc="-1" dirty="0">
+                <a:solidFill>
+                  <a:srgbClr val="000000"/>
+                </a:solidFill>
+                <a:latin typeface="Arial"/>
+                <a:ea typeface="DejaVu Sans"/>
+              </a:rPr>
+              <a:t>Users can </a:t>
+            </a:r>
+            <a:r>
+              <a:rPr lang="it-IT" sz="1800" b="0" strike="noStrike" spc="-1" dirty="0" err="1">
+                <a:solidFill>
+                  <a:srgbClr val="000000"/>
+                </a:solidFill>
+                <a:latin typeface="Arial"/>
+                <a:ea typeface="DejaVu Sans"/>
+              </a:rPr>
+              <a:t>sign</a:t>
+            </a:r>
+            <a:r>
+              <a:rPr lang="it-IT" sz="1800" b="0" strike="noStrike" spc="-1" dirty="0">
+                <a:solidFill>
+                  <a:srgbClr val="000000"/>
+                </a:solidFill>
+                <a:latin typeface="Arial"/>
+                <a:ea typeface="DejaVu Sans"/>
+              </a:rPr>
+              <a:t> up and </a:t>
+            </a:r>
+            <a:r>
+              <a:rPr lang="it-IT" sz="1800" b="0" strike="noStrike" spc="-1" dirty="0" err="1">
+                <a:solidFill>
+                  <a:srgbClr val="000000"/>
+                </a:solidFill>
+                <a:latin typeface="Arial"/>
+                <a:ea typeface="DejaVu Sans"/>
+              </a:rPr>
+              <a:t>sign</a:t>
+            </a:r>
+            <a:r>
+              <a:rPr lang="it-IT" sz="1800" b="0" strike="noStrike" spc="-1" dirty="0">
+                <a:solidFill>
+                  <a:srgbClr val="000000"/>
+                </a:solidFill>
+                <a:latin typeface="Arial"/>
+                <a:ea typeface="DejaVu Sans"/>
+              </a:rPr>
+              <a:t> in.</a:t>
+            </a:r>
+            <a:endParaRPr lang="it-IT" sz="1800" b="0" strike="noStrike" spc="-1" dirty="0">
               <a:latin typeface="Arial"/>
             </a:endParaRPr>
           </a:p>
@@ -4456,16 +4671,36 @@
               <a:buChar char=""/>
             </a:pPr>
             <a:r>
-              <a:rPr lang="it-IT" sz="1800" b="0" strike="noStrike" spc="-1">
-                <a:solidFill>
-                  <a:srgbClr val="000000"/>
-                </a:solidFill>
-                <a:latin typeface="Arial"/>
-                <a:ea typeface="DejaVu Sans"/>
-              </a:rPr>
-              <a:t>Users can view stock charts.</a:t>
-            </a:r>
-            <a:endParaRPr lang="it-IT" sz="1800" b="0" strike="noStrike" spc="-1">
+              <a:rPr lang="it-IT" sz="1800" b="0" strike="noStrike" spc="-1" dirty="0">
+                <a:solidFill>
+                  <a:srgbClr val="000000"/>
+                </a:solidFill>
+                <a:latin typeface="Arial"/>
+                <a:ea typeface="DejaVu Sans"/>
+              </a:rPr>
+              <a:t>Users can </a:t>
+            </a:r>
+            <a:r>
+              <a:rPr lang="it-IT" sz="1800" b="0" strike="noStrike" spc="-1" dirty="0" err="1">
+                <a:solidFill>
+                  <a:srgbClr val="000000"/>
+                </a:solidFill>
+                <a:latin typeface="Arial"/>
+                <a:ea typeface="DejaVu Sans"/>
+              </a:rPr>
+              <a:t>view</a:t>
+            </a:r>
+            <a:r>
+              <a:rPr lang="it-IT" sz="1800" b="0" strike="noStrike" spc="-1" dirty="0">
+                <a:solidFill>
+                  <a:srgbClr val="000000"/>
+                </a:solidFill>
+                <a:latin typeface="Arial"/>
+                <a:ea typeface="DejaVu Sans"/>
+              </a:rPr>
+              <a:t> stock charts.</a:t>
+            </a:r>
+            <a:endParaRPr lang="it-IT" sz="1800" b="0" strike="noStrike" spc="-1" dirty="0">
               <a:latin typeface="Arial"/>
             </a:endParaRPr>
           </a:p>
@@ -4481,7 +4716,7 @@
               <a:buChar char=""/>
             </a:pPr>
             <a:r>
-              <a:rPr lang="it-IT" sz="1800" b="0" strike="noStrike" spc="-1">
+              <a:rPr lang="it-IT" sz="1800" b="0" strike="noStrike" spc="-1" dirty="0">
                 <a:solidFill>
                   <a:srgbClr val="000000"/>
                 </a:solidFill>
@@ -4490,7 +4725,7 @@
               </a:rPr>
               <a:t>Users can create stock portfolios.</a:t>
             </a:r>
-            <a:endParaRPr lang="it-IT" sz="1800" b="0" strike="noStrike" spc="-1">
+            <a:endParaRPr lang="it-IT" sz="1800" b="0" strike="noStrike" spc="-1" dirty="0">
               <a:latin typeface="Arial"/>
             </a:endParaRPr>
           </a:p>
@@ -4506,7 +4741,7 @@
               <a:buChar char=""/>
             </a:pPr>
             <a:r>
-              <a:rPr lang="it-IT" sz="1800" b="0" strike="noStrike" spc="-1">
+              <a:rPr lang="it-IT" sz="1800" b="0" strike="noStrike" spc="-1" dirty="0">
                 <a:solidFill>
                   <a:srgbClr val="000000"/>
                 </a:solidFill>
@@ -4515,7 +4750,7 @@
               </a:rPr>
               <a:t>Users can simulate stock portfolios.</a:t>
             </a:r>
-            <a:endParaRPr lang="it-IT" sz="1800" b="0" strike="noStrike" spc="-1">
+            <a:endParaRPr lang="it-IT" sz="1800" b="0" strike="noStrike" spc="-1" dirty="0">
               <a:latin typeface="Arial"/>
             </a:endParaRPr>
           </a:p>
@@ -4531,16 +4766,116 @@
               <a:buChar char=""/>
             </a:pPr>
             <a:r>
-              <a:rPr lang="it-IT" sz="1800" b="0" strike="noStrike" spc="-1">
-                <a:solidFill>
-                  <a:srgbClr val="000000"/>
-                </a:solidFill>
-                <a:latin typeface="Arial"/>
-                <a:ea typeface="DejaVu Sans"/>
-              </a:rPr>
-              <a:t>At the end of each simulation, statistics are provided and visualized.</a:t>
-            </a:r>
-            <a:endParaRPr lang="it-IT" sz="1800" b="0" strike="noStrike" spc="-1">
+              <a:rPr lang="it-IT" sz="1800" b="0" strike="noStrike" spc="-1" dirty="0">
+                <a:solidFill>
+                  <a:srgbClr val="000000"/>
+                </a:solidFill>
+                <a:latin typeface="Arial"/>
+                <a:ea typeface="DejaVu Sans"/>
+              </a:rPr>
+              <a:t>At the end of </a:t>
+            </a:r>
+            <a:r>
+              <a:rPr lang="it-IT" sz="1800" b="0" strike="noStrike" spc="-1" dirty="0" err="1">
+                <a:solidFill>
+                  <a:srgbClr val="000000"/>
+                </a:solidFill>
+                <a:latin typeface="Arial"/>
+                <a:ea typeface="DejaVu Sans"/>
+              </a:rPr>
+              <a:t>each</a:t>
+            </a:r>
+            <a:r>
+              <a:rPr lang="it-IT" sz="1800" b="0" strike="noStrike" spc="-1" dirty="0">
+                <a:solidFill>
+                  <a:srgbClr val="000000"/>
+                </a:solidFill>
+                <a:latin typeface="Arial"/>
+                <a:ea typeface="DejaVu Sans"/>
+              </a:rPr>
+              <a:t> </a:t>
+            </a:r>
+            <a:r>
+              <a:rPr lang="it-IT" sz="1800" b="0" strike="noStrike" spc="-1" dirty="0" err="1">
+                <a:solidFill>
+                  <a:srgbClr val="000000"/>
+                </a:solidFill>
+                <a:latin typeface="Arial"/>
+                <a:ea typeface="DejaVu Sans"/>
+              </a:rPr>
+              <a:t>simulation</a:t>
+            </a:r>
+            <a:r>
+              <a:rPr lang="it-IT" sz="1800" b="0" strike="noStrike" spc="-1" dirty="0">
+                <a:solidFill>
+                  <a:srgbClr val="000000"/>
+                </a:solidFill>
+                <a:latin typeface="Arial"/>
+                <a:ea typeface="DejaVu Sans"/>
+              </a:rPr>
+              <a:t>, </a:t>
+            </a:r>
+            <a:r>
+              <a:rPr lang="it-IT" sz="1800" b="0" strike="noStrike" spc="-1" dirty="0" err="1">
+                <a:solidFill>
+                  <a:srgbClr val="000000"/>
+                </a:solidFill>
+                <a:latin typeface="Arial"/>
+                <a:ea typeface="DejaVu Sans"/>
+              </a:rPr>
+              <a:t>statistics</a:t>
+            </a:r>
+            <a:r>
+              <a:rPr lang="it-IT" sz="1800" b="0" strike="noStrike" spc="-1" dirty="0">
+                <a:solidFill>
+                  <a:srgbClr val="000000"/>
+                </a:solidFill>
+                <a:latin typeface="Arial"/>
+                <a:ea typeface="DejaVu Sans"/>
+              </a:rPr>
+              <a:t> are </a:t>
+            </a:r>
+            <a:r>
+              <a:rPr lang="it-IT" sz="1800" b="0" strike="noStrike" spc="-1" dirty="0" err="1">
+                <a:solidFill>
+                  <a:srgbClr val="000000"/>
+                </a:solidFill>
+                <a:latin typeface="Arial"/>
+                <a:ea typeface="DejaVu Sans"/>
+              </a:rPr>
+              <a:t>provided</a:t>
+            </a:r>
+            <a:r>
+              <a:rPr lang="it-IT" sz="1800" b="0" strike="noStrike" spc="-1" dirty="0">
+                <a:solidFill>
+                  <a:srgbClr val="000000"/>
+                </a:solidFill>
+                <a:latin typeface="Arial"/>
+                <a:ea typeface="DejaVu Sans"/>
+              </a:rPr>
+              <a:t> and </a:t>
+            </a:r>
+            <a:r>
+              <a:rPr lang="it-IT" sz="1800" b="0" strike="noStrike" spc="-1" dirty="0" err="1">
+                <a:solidFill>
+                  <a:srgbClr val="000000"/>
+                </a:solidFill>
+                <a:latin typeface="Arial"/>
+                <a:ea typeface="DejaVu Sans"/>
+              </a:rPr>
+              <a:t>visualized</a:t>
+            </a:r>
+            <a:r>
+              <a:rPr lang="it-IT" sz="1800" b="0" strike="noStrike" spc="-1" dirty="0">
+                <a:solidFill>
+                  <a:srgbClr val="000000"/>
+                </a:solidFill>
+                <a:latin typeface="Arial"/>
+                <a:ea typeface="DejaVu Sans"/>
+              </a:rPr>
+              <a:t>.</a:t>
+            </a:r>
+            <a:endParaRPr lang="it-IT" sz="1800" b="0" strike="noStrike" spc="-1" dirty="0">
               <a:latin typeface="Arial"/>
             </a:endParaRPr>
           </a:p>
@@ -4550,7 +4885,7 @@
                 <a:spcPct val="150000"/>
               </a:lnSpc>
             </a:pPr>
-            <a:endParaRPr lang="it-IT" sz="1800" b="0" strike="noStrike" spc="-1">
+            <a:endParaRPr lang="it-IT" sz="1800" b="0" strike="noStrike" spc="-1" dirty="0">
               <a:latin typeface="Arial"/>
             </a:endParaRPr>
           </a:p>
@@ -6053,129 +6388,9 @@
           <a:bodyPr lIns="90000" tIns="45000" rIns="90000" bIns="45000"/>
           <a:lstStyle/>
           <a:p>
-            <a:pPr>
-              <a:lnSpc>
-                <a:spcPct val="115000"/>
-              </a:lnSpc>
-            </a:pPr>
-            <a:r>
-              <a:rPr lang="it-IT" sz="1800" b="0" strike="noStrike" spc="-1" dirty="0">
-                <a:solidFill>
-                  <a:srgbClr val="000000"/>
-                </a:solidFill>
-                <a:latin typeface="Arial"/>
-                <a:ea typeface="DejaVu Sans"/>
-              </a:rPr>
-              <a:t>Include </a:t>
-            </a:r>
-            <a:r>
-              <a:rPr lang="it-IT" sz="1800" b="0" strike="noStrike" spc="-1" dirty="0" err="1">
-                <a:solidFill>
-                  <a:srgbClr val="000000"/>
-                </a:solidFill>
-                <a:latin typeface="Arial"/>
-                <a:ea typeface="DejaVu Sans"/>
-              </a:rPr>
-              <a:t>also</a:t>
-            </a:r>
-            <a:r>
-              <a:rPr lang="it-IT" sz="1800" b="0" strike="noStrike" spc="-1" dirty="0">
-                <a:solidFill>
-                  <a:srgbClr val="000000"/>
-                </a:solidFill>
-                <a:latin typeface="Arial"/>
-                <a:ea typeface="DejaVu Sans"/>
-              </a:rPr>
-              <a:t> the frameworks and tools </a:t>
-            </a:r>
-            <a:r>
-              <a:rPr lang="it-IT" sz="1800" b="0" strike="noStrike" spc="-1" dirty="0" err="1">
-                <a:solidFill>
-                  <a:srgbClr val="000000"/>
-                </a:solidFill>
-                <a:latin typeface="Arial"/>
-                <a:ea typeface="DejaVu Sans"/>
-              </a:rPr>
-              <a:t>that</a:t>
-            </a:r>
-            <a:r>
-              <a:rPr lang="it-IT" sz="1800" b="0" strike="noStrike" spc="-1" dirty="0">
-                <a:solidFill>
-                  <a:srgbClr val="000000"/>
-                </a:solidFill>
-                <a:latin typeface="Arial"/>
-                <a:ea typeface="DejaVu Sans"/>
-              </a:rPr>
-              <a:t> the group </a:t>
-            </a:r>
-            <a:r>
-              <a:rPr lang="it-IT" sz="1800" b="0" strike="noStrike" spc="-1" dirty="0" err="1">
-                <a:solidFill>
-                  <a:srgbClr val="000000"/>
-                </a:solidFill>
-                <a:latin typeface="Arial"/>
-                <a:ea typeface="DejaVu Sans"/>
-              </a:rPr>
-              <a:t>would</a:t>
-            </a:r>
-            <a:r>
-              <a:rPr lang="it-IT" sz="1800" b="0" strike="noStrike" spc="-1" dirty="0">
-                <a:solidFill>
-                  <a:srgbClr val="000000"/>
-                </a:solidFill>
-                <a:latin typeface="Arial"/>
-                <a:ea typeface="DejaVu Sans"/>
-              </a:rPr>
-              <a:t> like to use (programming </a:t>
-            </a:r>
-            <a:r>
-              <a:rPr lang="it-IT" sz="1800" b="0" strike="noStrike" spc="-1" dirty="0" err="1">
-                <a:solidFill>
-                  <a:srgbClr val="000000"/>
-                </a:solidFill>
-                <a:latin typeface="Arial"/>
-                <a:ea typeface="DejaVu Sans"/>
-              </a:rPr>
-              <a:t>languages</a:t>
-            </a:r>
-            <a:r>
-              <a:rPr lang="it-IT" sz="1800" b="0" strike="noStrike" spc="-1" dirty="0">
-                <a:solidFill>
-                  <a:srgbClr val="000000"/>
-                </a:solidFill>
-                <a:latin typeface="Arial"/>
-                <a:ea typeface="DejaVu Sans"/>
-              </a:rPr>
-              <a:t>, </a:t>
-            </a:r>
-            <a:r>
-              <a:rPr lang="it-IT" sz="1800" b="0" strike="noStrike" spc="-1" dirty="0" err="1">
-                <a:solidFill>
-                  <a:srgbClr val="000000"/>
-                </a:solidFill>
-                <a:latin typeface="Arial"/>
-                <a:ea typeface="DejaVu Sans"/>
-              </a:rPr>
-              <a:t>DBMSs</a:t>
-            </a:r>
-            <a:r>
-              <a:rPr lang="it-IT" sz="1800" b="0" strike="noStrike" spc="-1" dirty="0">
-                <a:solidFill>
-                  <a:srgbClr val="000000"/>
-                </a:solidFill>
-                <a:latin typeface="Arial"/>
-                <a:ea typeface="DejaVu Sans"/>
-              </a:rPr>
-              <a:t>, etc..)</a:t>
-            </a:r>
-            <a:endParaRPr lang="it-IT" sz="1800" b="0" strike="noStrike" spc="-1" dirty="0">
-              <a:latin typeface="Arial"/>
-            </a:endParaRPr>
-          </a:p>
-          <a:p>
             <a:pPr marL="285840" indent="-284400">
               <a:lnSpc>
-                <a:spcPct val="115000"/>
+                <a:spcPct val="150000"/>
               </a:lnSpc>
               <a:buClr>
                 <a:srgbClr val="000000"/>
@@ -6200,7 +6415,7 @@
           <a:p>
             <a:pPr marL="285840" indent="-284400">
               <a:lnSpc>
-                <a:spcPct val="115000"/>
+                <a:spcPct val="150000"/>
               </a:lnSpc>
               <a:buClr>
                 <a:srgbClr val="000000"/>
@@ -6265,7 +6480,7 @@
           <a:p>
             <a:pPr marL="285840" indent="-284400">
               <a:lnSpc>
-                <a:spcPct val="115000"/>
+                <a:spcPct val="150000"/>
               </a:lnSpc>
               <a:buClr>
                 <a:srgbClr val="000000"/>
@@ -6300,7 +6515,7 @@
           <a:p>
             <a:pPr marL="285840" indent="-284400">
               <a:lnSpc>
-                <a:spcPct val="115000"/>
+                <a:spcPct val="150000"/>
               </a:lnSpc>
               <a:buClr>
                 <a:srgbClr val="000000"/>
@@ -6325,7 +6540,7 @@
           <a:p>
             <a:pPr marL="285840" indent="-284400">
               <a:lnSpc>
-                <a:spcPct val="115000"/>
+                <a:spcPct val="150000"/>
               </a:lnSpc>
               <a:buClr>
                 <a:srgbClr val="000000"/>
@@ -6416,7 +6631,7 @@
           <a:p>
             <a:pPr marL="285840" indent="-284400">
               <a:lnSpc>
-                <a:spcPct val="115000"/>
+                <a:spcPct val="150000"/>
               </a:lnSpc>
               <a:buClr>
                 <a:srgbClr val="000000"/>
@@ -6461,7 +6676,7 @@
           <a:p>
             <a:pPr marL="285840" indent="-284400">
               <a:lnSpc>
-                <a:spcPct val="115000"/>
+                <a:spcPct val="150000"/>
               </a:lnSpc>
               <a:buClr>
                 <a:srgbClr val="000000"/>
@@ -6486,7 +6701,7 @@
           <a:p>
             <a:pPr marL="285840" indent="-284400">
               <a:lnSpc>
-                <a:spcPct val="115000"/>
+                <a:spcPct val="150000"/>
               </a:lnSpc>
               <a:buClr>
                 <a:srgbClr val="000000"/>
@@ -6511,7 +6726,7 @@
           <a:p>
             <a:pPr marL="285840" indent="-284400">
               <a:lnSpc>
-                <a:spcPct val="115000"/>
+                <a:spcPct val="150000"/>
               </a:lnSpc>
               <a:buClr>
                 <a:srgbClr val="000000"/>
@@ -6536,7 +6751,7 @@
           <a:p>
             <a:pPr marL="285840" indent="-284400">
               <a:lnSpc>
-                <a:spcPct val="115000"/>
+                <a:spcPct val="150000"/>
               </a:lnSpc>
               <a:buClr>
                 <a:srgbClr val="000000"/>
@@ -6560,6 +6775,393 @@
           </a:p>
         </p:txBody>
       </p:sp>
+      <p:pic>
+        <p:nvPicPr>
+          <p:cNvPr id="3" name="log4j_logo" descr="Immagine che contiene disegnando&#10;&#10;Descrizione generata automaticamente">
+            <a:extLst>
+              <a:ext uri="{FF2B5EF4-FFF2-40B4-BE49-F238E27FC236}">
+                <a16:creationId xmlns:a16="http://schemas.microsoft.com/office/drawing/2014/main" id="{EE51AEC9-1011-4C8D-927F-4E36DA7D3CBB}"/>
+              </a:ext>
+            </a:extLst>
+          </p:cNvPr>
+          <p:cNvPicPr>
+            <a:picLocks noChangeAspect="1"/>
+          </p:cNvPicPr>
+          <p:nvPr/>
+        </p:nvPicPr>
+        <p:blipFill>
+          <a:blip r:embed="rId2">
+            <a:extLst>
+              <a:ext uri="{28A0092B-C50C-407E-A947-70E740481C1C}">
+                <a14:useLocalDpi xmlns:a14="http://schemas.microsoft.com/office/drawing/2010/main" val="0"/>
+              </a:ext>
+            </a:extLst>
+          </a:blip>
+          <a:stretch>
+            <a:fillRect/>
+          </a:stretch>
+        </p:blipFill>
+        <p:spPr>
+          <a:xfrm>
+            <a:off x="3532749" y="4258137"/>
+            <a:ext cx="1358126" cy="522029"/>
+          </a:xfrm>
+          <a:prstGeom prst="rect">
+            <a:avLst/>
+          </a:prstGeom>
+        </p:spPr>
+      </p:pic>
+      <p:pic>
+        <p:nvPicPr>
+          <p:cNvPr id="5" name="cassandra_logo">
+            <a:extLst>
+              <a:ext uri="{FF2B5EF4-FFF2-40B4-BE49-F238E27FC236}">
+                <a16:creationId xmlns:a16="http://schemas.microsoft.com/office/drawing/2014/main" id="{3ADF158C-D957-4FAA-AA92-595AE2A2ED92}"/>
+              </a:ext>
+            </a:extLst>
+          </p:cNvPr>
+          <p:cNvPicPr>
+            <a:picLocks noChangeAspect="1"/>
+          </p:cNvPicPr>
+          <p:nvPr/>
+        </p:nvPicPr>
+        <p:blipFill>
+          <a:blip r:embed="rId3">
+            <a:extLst>
+              <a:ext uri="{28A0092B-C50C-407E-A947-70E740481C1C}">
+                <a14:useLocalDpi xmlns:a14="http://schemas.microsoft.com/office/drawing/2010/main" val="0"/>
+              </a:ext>
+              <a:ext uri="{96DAC541-7B7A-43D3-8B79-37D633B846F1}">
+                <asvg:svgBlip xmlns:asvg="http://schemas.microsoft.com/office/drawing/2016/SVG/main" r:embed="rId4"/>
+              </a:ext>
+            </a:extLst>
+          </a:blip>
+          <a:stretch>
+            <a:fillRect/>
+          </a:stretch>
+        </p:blipFill>
+        <p:spPr>
+          <a:xfrm>
+            <a:off x="7503297" y="3850024"/>
+            <a:ext cx="1263196" cy="846658"/>
+          </a:xfrm>
+          <a:prstGeom prst="rect">
+            <a:avLst/>
+          </a:prstGeom>
+        </p:spPr>
+      </p:pic>
+      <p:pic>
+        <p:nvPicPr>
+          <p:cNvPr id="7" name="git_logo">
+            <a:extLst>
+              <a:ext uri="{FF2B5EF4-FFF2-40B4-BE49-F238E27FC236}">
+                <a16:creationId xmlns:a16="http://schemas.microsoft.com/office/drawing/2014/main" id="{4E11190C-ED32-47E3-9E6C-A5F95820A32C}"/>
+              </a:ext>
+            </a:extLst>
+          </p:cNvPr>
+          <p:cNvPicPr>
+            <a:picLocks noChangeAspect="1"/>
+          </p:cNvPicPr>
+          <p:nvPr/>
+        </p:nvPicPr>
+        <p:blipFill>
+          <a:blip r:embed="rId5">
+            <a:extLst>
+              <a:ext uri="{28A0092B-C50C-407E-A947-70E740481C1C}">
+                <a14:useLocalDpi xmlns:a14="http://schemas.microsoft.com/office/drawing/2010/main" val="0"/>
+              </a:ext>
+              <a:ext uri="{96DAC541-7B7A-43D3-8B79-37D633B846F1}">
+                <asvg:svgBlip xmlns:asvg="http://schemas.microsoft.com/office/drawing/2016/SVG/main" r:embed="rId6"/>
+              </a:ext>
+            </a:extLst>
+          </a:blip>
+          <a:stretch>
+            <a:fillRect/>
+          </a:stretch>
+        </p:blipFill>
+        <p:spPr>
+          <a:xfrm>
+            <a:off x="7107133" y="4955198"/>
+            <a:ext cx="1237036" cy="522029"/>
+          </a:xfrm>
+          <a:prstGeom prst="rect">
+            <a:avLst/>
+          </a:prstGeom>
+        </p:spPr>
+      </p:pic>
+      <p:pic>
+        <p:nvPicPr>
+          <p:cNvPr id="9" name="intellijidea_logo">
+            <a:extLst>
+              <a:ext uri="{FF2B5EF4-FFF2-40B4-BE49-F238E27FC236}">
+                <a16:creationId xmlns:a16="http://schemas.microsoft.com/office/drawing/2014/main" id="{060D4734-70FA-488F-AF95-DD0F4C4623A6}"/>
+              </a:ext>
+            </a:extLst>
+          </p:cNvPr>
+          <p:cNvPicPr>
+            <a:picLocks noChangeAspect="1"/>
+          </p:cNvPicPr>
+          <p:nvPr/>
+        </p:nvPicPr>
+        <p:blipFill>
+          <a:blip r:embed="rId7">
+            <a:extLst>
+              <a:ext uri="{28A0092B-C50C-407E-A947-70E740481C1C}">
+                <a14:useLocalDpi xmlns:a14="http://schemas.microsoft.com/office/drawing/2010/main" val="0"/>
+              </a:ext>
+              <a:ext uri="{96DAC541-7B7A-43D3-8B79-37D633B846F1}">
+                <asvg:svgBlip xmlns:asvg="http://schemas.microsoft.com/office/drawing/2016/SVG/main" r:embed="rId8"/>
+              </a:ext>
+            </a:extLst>
+          </a:blip>
+          <a:stretch>
+            <a:fillRect/>
+          </a:stretch>
+        </p:blipFill>
+        <p:spPr>
+          <a:xfrm>
+            <a:off x="5639769" y="1450817"/>
+            <a:ext cx="666750" cy="666750"/>
+          </a:xfrm>
+          <a:prstGeom prst="rect">
+            <a:avLst/>
+          </a:prstGeom>
+        </p:spPr>
+      </p:pic>
+      <p:pic>
+        <p:nvPicPr>
+          <p:cNvPr id="11" name="java_logo">
+            <a:extLst>
+              <a:ext uri="{FF2B5EF4-FFF2-40B4-BE49-F238E27FC236}">
+                <a16:creationId xmlns:a16="http://schemas.microsoft.com/office/drawing/2014/main" id="{819F39C0-08E7-4F57-828D-BDC44EFC9945}"/>
+              </a:ext>
+            </a:extLst>
+          </p:cNvPr>
+          <p:cNvPicPr>
+            <a:picLocks noChangeAspect="1"/>
+          </p:cNvPicPr>
+          <p:nvPr/>
+        </p:nvPicPr>
+        <p:blipFill>
+          <a:blip r:embed="rId9">
+            <a:extLst>
+              <a:ext uri="{28A0092B-C50C-407E-A947-70E740481C1C}">
+                <a14:useLocalDpi xmlns:a14="http://schemas.microsoft.com/office/drawing/2010/main" val="0"/>
+              </a:ext>
+              <a:ext uri="{96DAC541-7B7A-43D3-8B79-37D633B846F1}">
+                <asvg:svgBlip xmlns:asvg="http://schemas.microsoft.com/office/drawing/2016/SVG/main" r:embed="rId10"/>
+              </a:ext>
+            </a:extLst>
+          </a:blip>
+          <a:stretch>
+            <a:fillRect/>
+          </a:stretch>
+        </p:blipFill>
+        <p:spPr>
+          <a:xfrm>
+            <a:off x="4211812" y="1156525"/>
+            <a:ext cx="635118" cy="1182324"/>
+          </a:xfrm>
+          <a:prstGeom prst="rect">
+            <a:avLst/>
+          </a:prstGeom>
+        </p:spPr>
+      </p:pic>
+      <p:pic>
+        <p:nvPicPr>
+          <p:cNvPr id="13" name="JUnit_logo">
+            <a:extLst>
+              <a:ext uri="{FF2B5EF4-FFF2-40B4-BE49-F238E27FC236}">
+                <a16:creationId xmlns:a16="http://schemas.microsoft.com/office/drawing/2014/main" id="{B0B12E6D-DB81-425A-8381-0197C7931EE1}"/>
+              </a:ext>
+            </a:extLst>
+          </p:cNvPr>
+          <p:cNvPicPr>
+            <a:picLocks noChangeAspect="1"/>
+          </p:cNvPicPr>
+          <p:nvPr/>
+        </p:nvPicPr>
+        <p:blipFill>
+          <a:blip r:embed="rId11">
+            <a:extLst>
+              <a:ext uri="{28A0092B-C50C-407E-A947-70E740481C1C}">
+                <a14:useLocalDpi xmlns:a14="http://schemas.microsoft.com/office/drawing/2010/main" val="0"/>
+              </a:ext>
+              <a:ext uri="{96DAC541-7B7A-43D3-8B79-37D633B846F1}">
+                <asvg:svgBlip xmlns:asvg="http://schemas.microsoft.com/office/drawing/2016/SVG/main" r:embed="rId12"/>
+              </a:ext>
+            </a:extLst>
+          </a:blip>
+          <a:stretch>
+            <a:fillRect/>
+          </a:stretch>
+        </p:blipFill>
+        <p:spPr>
+          <a:xfrm>
+            <a:off x="5191698" y="4649171"/>
+            <a:ext cx="1352015" cy="412829"/>
+          </a:xfrm>
+          <a:prstGeom prst="rect">
+            <a:avLst/>
+          </a:prstGeom>
+        </p:spPr>
+      </p:pic>
+      <p:pic>
+        <p:nvPicPr>
+          <p:cNvPr id="15" name="maven_logo">
+            <a:extLst>
+              <a:ext uri="{FF2B5EF4-FFF2-40B4-BE49-F238E27FC236}">
+                <a16:creationId xmlns:a16="http://schemas.microsoft.com/office/drawing/2014/main" id="{45AC39D5-17C8-405A-AEE3-7B9FFE6E880E}"/>
+              </a:ext>
+            </a:extLst>
+          </p:cNvPr>
+          <p:cNvPicPr>
+            <a:picLocks noChangeAspect="1"/>
+          </p:cNvPicPr>
+          <p:nvPr/>
+        </p:nvPicPr>
+        <p:blipFill>
+          <a:blip r:embed="rId13">
+            <a:extLst>
+              <a:ext uri="{28A0092B-C50C-407E-A947-70E740481C1C}">
+                <a14:useLocalDpi xmlns:a14="http://schemas.microsoft.com/office/drawing/2010/main" val="0"/>
+              </a:ext>
+              <a:ext uri="{96DAC541-7B7A-43D3-8B79-37D633B846F1}">
+                <asvg:svgBlip xmlns:asvg="http://schemas.microsoft.com/office/drawing/2016/SVG/main" r:embed="rId14"/>
+              </a:ext>
+            </a:extLst>
+          </a:blip>
+          <a:stretch>
+            <a:fillRect/>
+          </a:stretch>
+        </p:blipFill>
+        <p:spPr>
+          <a:xfrm>
+            <a:off x="6975860" y="1584509"/>
+            <a:ext cx="1841620" cy="465821"/>
+          </a:xfrm>
+          <a:prstGeom prst="rect">
+            <a:avLst/>
+          </a:prstGeom>
+        </p:spPr>
+      </p:pic>
+      <p:pic>
+        <p:nvPicPr>
+          <p:cNvPr id="17" name="mongodb_logo">
+            <a:extLst>
+              <a:ext uri="{FF2B5EF4-FFF2-40B4-BE49-F238E27FC236}">
+                <a16:creationId xmlns:a16="http://schemas.microsoft.com/office/drawing/2014/main" id="{CFE40899-930C-4839-97D6-296713499E07}"/>
+              </a:ext>
+            </a:extLst>
+          </p:cNvPr>
+          <p:cNvPicPr>
+            <a:picLocks noChangeAspect="1"/>
+          </p:cNvPicPr>
+          <p:nvPr/>
+        </p:nvPicPr>
+        <p:blipFill>
+          <a:blip r:embed="rId15">
+            <a:extLst>
+              <a:ext uri="{28A0092B-C50C-407E-A947-70E740481C1C}">
+                <a14:useLocalDpi xmlns:a14="http://schemas.microsoft.com/office/drawing/2010/main" val="0"/>
+              </a:ext>
+              <a:ext uri="{96DAC541-7B7A-43D3-8B79-37D633B846F1}">
+                <asvg:svgBlip xmlns:asvg="http://schemas.microsoft.com/office/drawing/2016/SVG/main" r:embed="rId16"/>
+              </a:ext>
+            </a:extLst>
+          </a:blip>
+          <a:stretch>
+            <a:fillRect/>
+          </a:stretch>
+        </p:blipFill>
+        <p:spPr>
+          <a:xfrm>
+            <a:off x="5379134" y="3440332"/>
+            <a:ext cx="1936726" cy="522029"/>
+          </a:xfrm>
+          <a:prstGeom prst="rect">
+            <a:avLst/>
+          </a:prstGeom>
+        </p:spPr>
+      </p:pic>
+      <p:pic>
+        <p:nvPicPr>
+          <p:cNvPr id="19" name="python_logo">
+            <a:extLst>
+              <a:ext uri="{FF2B5EF4-FFF2-40B4-BE49-F238E27FC236}">
+                <a16:creationId xmlns:a16="http://schemas.microsoft.com/office/drawing/2014/main" id="{08F5F161-4263-4731-8BE1-315E3CE2D93A}"/>
+              </a:ext>
+            </a:extLst>
+          </p:cNvPr>
+          <p:cNvPicPr>
+            <a:picLocks noChangeAspect="1"/>
+          </p:cNvPicPr>
+          <p:nvPr/>
+        </p:nvPicPr>
+        <p:blipFill>
+          <a:blip r:embed="rId17">
+            <a:extLst>
+              <a:ext uri="{28A0092B-C50C-407E-A947-70E740481C1C}">
+                <a14:useLocalDpi xmlns:a14="http://schemas.microsoft.com/office/drawing/2010/main" val="0"/>
+              </a:ext>
+              <a:ext uri="{96DAC541-7B7A-43D3-8B79-37D633B846F1}">
+                <asvg:svgBlip xmlns:asvg="http://schemas.microsoft.com/office/drawing/2016/SVG/main" r:embed="rId18"/>
+              </a:ext>
+            </a:extLst>
+          </a:blip>
+          <a:stretch>
+            <a:fillRect/>
+          </a:stretch>
+        </p:blipFill>
+        <p:spPr>
+          <a:xfrm>
+            <a:off x="5191698" y="2356310"/>
+            <a:ext cx="2311599" cy="682769"/>
+          </a:xfrm>
+          <a:prstGeom prst="rect">
+            <a:avLst/>
+          </a:prstGeom>
+        </p:spPr>
+      </p:pic>
+      <p:pic>
+        <p:nvPicPr>
+          <p:cNvPr id="21" name="yahoofinance_logo">
+            <a:extLst>
+              <a:ext uri="{FF2B5EF4-FFF2-40B4-BE49-F238E27FC236}">
+                <a16:creationId xmlns:a16="http://schemas.microsoft.com/office/drawing/2014/main" id="{048765BE-4DEC-4B3B-81C3-6BFA082C93F2}"/>
+              </a:ext>
+            </a:extLst>
+          </p:cNvPr>
+          <p:cNvPicPr>
+            <a:picLocks noChangeAspect="1"/>
+          </p:cNvPicPr>
+          <p:nvPr/>
+        </p:nvPicPr>
+        <p:blipFill>
+          <a:blip r:embed="rId19">
+            <a:extLst>
+              <a:ext uri="{28A0092B-C50C-407E-A947-70E740481C1C}">
+                <a14:useLocalDpi xmlns:a14="http://schemas.microsoft.com/office/drawing/2010/main" val="0"/>
+              </a:ext>
+              <a:ext uri="{96DAC541-7B7A-43D3-8B79-37D633B846F1}">
+                <asvg:svgBlip xmlns:asvg="http://schemas.microsoft.com/office/drawing/2016/SVG/main" r:embed="rId20"/>
+              </a:ext>
+            </a:extLst>
+          </a:blip>
+          <a:stretch>
+            <a:fillRect/>
+          </a:stretch>
+        </p:blipFill>
+        <p:spPr>
+          <a:xfrm>
+            <a:off x="7214324" y="2839379"/>
+            <a:ext cx="1766489" cy="896695"/>
+          </a:xfrm>
+          <a:prstGeom prst="rect">
+            <a:avLst/>
+          </a:prstGeom>
+        </p:spPr>
+      </p:pic>
     </p:spTree>
   </p:cSld>
   <p:clrMapOvr>

</xml_diff>

<commit_message>
Finish slides for the presentation.
</commit_message>
<xml_diff>
--- a/documentation/stocksim_preliminary_presentation.pptx
+++ b/documentation/stocksim_preliminary_presentation.pptx
@@ -3904,7 +3904,7 @@
                 <a:latin typeface="Arial"/>
                 <a:ea typeface="DejaVu Sans"/>
               </a:rPr>
-              <a:t>StockSim is a Java Application which allows users to simulate stock portfolios using statistical models built using NASDAQ historical data.</a:t>
+              <a:t>StockSim is a Java Application which allows users to simulate stock portfolios using statistical models built using U.S. stock market historical data.</a:t>
             </a:r>
             <a:endParaRPr b="0" lang="it-IT" sz="1800" spc="-1" strike="noStrike">
               <a:latin typeface="Arial"/>
@@ -4149,7 +4149,7 @@
       </p:sp>
       <p:pic>
         <p:nvPicPr>
-          <p:cNvPr id="87" name="Immagine 2" descr=""/>
+          <p:cNvPr id="87" name="" descr=""/>
           <p:cNvPicPr/>
           <p:nvPr/>
         </p:nvPicPr>
@@ -4159,8 +4159,8 @@
         </p:blipFill>
         <p:spPr>
           <a:xfrm>
-            <a:off x="977760" y="1613160"/>
-            <a:ext cx="7008840" cy="4118040"/>
+            <a:off x="640080" y="1034640"/>
+            <a:ext cx="7772400" cy="4994640"/>
           </a:xfrm>
           <a:prstGeom prst="rect">
             <a:avLst/>
@@ -4549,7 +4549,7 @@
                 <a:latin typeface="Arial"/>
                 <a:ea typeface="DejaVu Sans"/>
               </a:rPr>
-              <a:t>: TODO</a:t>
+              <a:t>: granted by the heterogeneous composition of the NASDAQ index.</a:t>
             </a:r>
             <a:endParaRPr b="0" lang="it-IT" sz="1800" spc="-1" strike="noStrike">
               <a:latin typeface="Arial"/>
@@ -4589,7 +4589,7 @@
                 <a:latin typeface="Arial"/>
                 <a:ea typeface="DejaVu Sans"/>
               </a:rPr>
-              <a:t>: indices and shares of each of the 8000+ NASDAQ stocks are updated automatically every day.</a:t>
+              <a:t>: indices and shares of each of the 8000+ U.S. stock market stocks are updated automatically every day.</a:t>
             </a:r>
             <a:endParaRPr b="0" lang="it-IT" sz="1800" spc="-1" strike="noStrike">
               <a:latin typeface="Arial"/>
@@ -4705,6 +4705,29 @@
           </a:p>
         </p:txBody>
       </p:sp>
+      <p:pic>
+        <p:nvPicPr>
+          <p:cNvPr id="91" name="" descr=""/>
+          <p:cNvPicPr/>
+          <p:nvPr/>
+        </p:nvPicPr>
+        <p:blipFill>
+          <a:blip r:embed="rId1"/>
+          <a:stretch/>
+        </p:blipFill>
+        <p:spPr>
+          <a:xfrm>
+            <a:off x="1122480" y="1424520"/>
+            <a:ext cx="6891840" cy="4083480"/>
+          </a:xfrm>
+          <a:prstGeom prst="rect">
+            <a:avLst/>
+          </a:prstGeom>
+          <a:ln>
+            <a:noFill/>
+          </a:ln>
+        </p:spPr>
+      </p:pic>
     </p:spTree>
   </p:cSld>
   <p:timing>
@@ -4756,7 +4779,7 @@
       </p:grpSpPr>
       <p:sp>
         <p:nvSpPr>
-          <p:cNvPr id="91" name="CustomShape 1"/>
+          <p:cNvPr id="92" name="CustomShape 1"/>
           <p:cNvSpPr/>
           <p:nvPr/>
         </p:nvSpPr>
@@ -4818,7 +4841,7 @@
       </p:sp>
       <p:sp>
         <p:nvSpPr>
-          <p:cNvPr id="92" name="CustomShape 2"/>
+          <p:cNvPr id="93" name="CustomShape 2"/>
           <p:cNvSpPr/>
           <p:nvPr/>
         </p:nvSpPr>
@@ -4846,7 +4869,7 @@
           <a:p>
             <a:pPr marL="285840" indent="-284040">
               <a:lnSpc>
-                <a:spcPct val="150000"/>
+                <a:spcPct val="115000"/>
               </a:lnSpc>
               <a:buClr>
                 <a:srgbClr val="000000"/>
@@ -4862,7 +4885,17 @@
                 <a:latin typeface="Arial"/>
                 <a:ea typeface="DejaVu Sans"/>
               </a:rPr>
-              <a:t>Users’ personal information and preferences</a:t>
+              <a:t>Users’ authentication, </a:t>
+            </a:r>
+            <a:r>
+              <a:rPr b="0" lang="it-IT" sz="2400" spc="-1" strike="noStrike">
+                <a:solidFill>
+                  <a:srgbClr val="000000"/>
+                </a:solidFill>
+                <a:latin typeface="Arial"/>
+                <a:ea typeface="DejaVu Sans"/>
+              </a:rPr>
+              <a:t>personal information and preferences.</a:t>
             </a:r>
             <a:endParaRPr b="0" lang="it-IT" sz="2400" spc="-1" strike="noStrike">
               <a:latin typeface="Arial"/>
@@ -4871,7 +4904,7 @@
           <a:p>
             <a:pPr marL="285840" indent="-284040">
               <a:lnSpc>
-                <a:spcPct val="150000"/>
+                <a:spcPct val="115000"/>
               </a:lnSpc>
               <a:buClr>
                 <a:srgbClr val="000000"/>
@@ -4887,7 +4920,7 @@
                 <a:latin typeface="Arial"/>
                 <a:ea typeface="DejaVu Sans"/>
               </a:rPr>
-              <a:t>Users’ authentication</a:t>
+              <a:t>Stocks’ information (company details, trade, capitalization, etc…).</a:t>
             </a:r>
             <a:endParaRPr b="0" lang="it-IT" sz="2400" spc="-1" strike="noStrike">
               <a:latin typeface="Arial"/>
@@ -4896,7 +4929,7 @@
           <a:p>
             <a:pPr marL="285840" indent="-284040">
               <a:lnSpc>
-                <a:spcPct val="150000"/>
+                <a:spcPct val="115000"/>
               </a:lnSpc>
               <a:buClr>
                 <a:srgbClr val="000000"/>
@@ -4912,7 +4945,7 @@
                 <a:latin typeface="Arial"/>
                 <a:ea typeface="DejaVu Sans"/>
               </a:rPr>
-              <a:t>Stocks’ information (company details, trade, capitalization…)</a:t>
+              <a:t>Indexes’ information (composition, details, etc…).</a:t>
             </a:r>
             <a:endParaRPr b="0" lang="it-IT" sz="2400" spc="-1" strike="noStrike">
               <a:latin typeface="Arial"/>
@@ -4921,7 +4954,7 @@
           <a:p>
             <a:pPr marL="285840" indent="-284040">
               <a:lnSpc>
-                <a:spcPct val="150000"/>
+                <a:spcPct val="115000"/>
               </a:lnSpc>
               <a:buClr>
                 <a:srgbClr val="000000"/>
@@ -4937,7 +4970,17 @@
                 <a:latin typeface="Arial"/>
                 <a:ea typeface="DejaVu Sans"/>
               </a:rPr>
-              <a:t>Indexes’ information (composition, details…)</a:t>
+              <a:t>Stock Portfolio’s information (name, composition, scope</a:t>
+            </a:r>
+            <a:r>
+              <a:rPr b="0" lang="it-IT" sz="2400" spc="-1" strike="noStrike">
+                <a:solidFill>
+                  <a:srgbClr val="000000"/>
+                </a:solidFill>
+                <a:latin typeface="Arial"/>
+                <a:ea typeface="DejaVu Sans"/>
+              </a:rPr>
+              <a:t>, etc…).</a:t>
             </a:r>
             <a:endParaRPr b="0" lang="it-IT" sz="2400" spc="-1" strike="noStrike">
               <a:latin typeface="Arial"/>
@@ -4946,7 +4989,7 @@
           <a:p>
             <a:pPr marL="285840" indent="-284040">
               <a:lnSpc>
-                <a:spcPct val="150000"/>
+                <a:spcPct val="115000"/>
               </a:lnSpc>
               <a:buClr>
                 <a:srgbClr val="000000"/>
@@ -4962,7 +5005,7 @@
                 <a:latin typeface="Arial"/>
                 <a:ea typeface="DejaVu Sans"/>
               </a:rPr>
-              <a:t>Portfolio’s information (name, composition, scope…) </a:t>
+              <a:t>Stock portfolio simulation results.</a:t>
             </a:r>
             <a:endParaRPr b="0" lang="it-IT" sz="2400" spc="-1" strike="noStrike">
               <a:latin typeface="Arial"/>
@@ -4971,7 +5014,7 @@
           <a:p>
             <a:pPr>
               <a:lnSpc>
-                <a:spcPct val="150000"/>
+                <a:spcPct val="115000"/>
               </a:lnSpc>
             </a:pPr>
             <a:endParaRPr b="0" lang="it-IT" sz="2400" spc="-1" strike="noStrike">
@@ -5031,7 +5074,7 @@
       </p:grpSpPr>
       <p:sp>
         <p:nvSpPr>
-          <p:cNvPr id="93" name="CustomShape 1"/>
+          <p:cNvPr id="94" name="CustomShape 1"/>
           <p:cNvSpPr/>
           <p:nvPr/>
         </p:nvSpPr>
@@ -5093,14 +5136,14 @@
       </p:sp>
       <p:sp>
         <p:nvSpPr>
-          <p:cNvPr id="94" name="CustomShape 2"/>
+          <p:cNvPr id="95" name="CustomShape 2"/>
           <p:cNvSpPr/>
           <p:nvPr/>
         </p:nvSpPr>
         <p:spPr>
           <a:xfrm>
             <a:off x="542520" y="1537560"/>
-            <a:ext cx="8087040" cy="698040"/>
+            <a:ext cx="8087040" cy="3308760"/>
           </a:xfrm>
           <a:prstGeom prst="rect">
             <a:avLst/>
@@ -5137,7 +5180,83 @@
                 <a:latin typeface="Arial"/>
                 <a:ea typeface="DejaVu Sans"/>
               </a:rPr>
-              <a:t>Stock historical prices and data</a:t>
+              <a:t>U.S. stock market stocks and ETFs historical data day by day, starting from 1971:</a:t>
+            </a:r>
+            <a:endParaRPr b="0" lang="it-IT" sz="2000" spc="-1" strike="noStrike">
+              <a:latin typeface="Arial"/>
+            </a:endParaRPr>
+          </a:p>
+          <a:p>
+            <a:pPr lvl="2" marL="648000" indent="-216000">
+              <a:lnSpc>
+                <a:spcPct val="150000"/>
+              </a:lnSpc>
+              <a:buClr>
+                <a:srgbClr val="000000"/>
+              </a:buClr>
+              <a:buSzPct val="45000"/>
+              <a:buFont typeface="Wingdings" charset="2"/>
+              <a:buChar char=""/>
+            </a:pPr>
+            <a:r>
+              <a:rPr b="0" lang="it-IT" sz="2000" spc="-1" strike="noStrike">
+                <a:solidFill>
+                  <a:srgbClr val="000000"/>
+                </a:solidFill>
+                <a:latin typeface="Arial"/>
+                <a:ea typeface="DejaVu Sans"/>
+              </a:rPr>
+              <a:t>open, high, low, close and adjusted close prices.</a:t>
+            </a:r>
+            <a:endParaRPr b="0" lang="it-IT" sz="2000" spc="-1" strike="noStrike">
+              <a:latin typeface="Arial"/>
+            </a:endParaRPr>
+          </a:p>
+          <a:p>
+            <a:pPr marL="285840" indent="-284040">
+              <a:lnSpc>
+                <a:spcPct val="150000"/>
+              </a:lnSpc>
+              <a:buClr>
+                <a:srgbClr val="000000"/>
+              </a:buClr>
+              <a:buFont typeface="Arial"/>
+              <a:buChar char="•"/>
+            </a:pPr>
+            <a:r>
+              <a:rPr b="0" lang="it-IT" sz="2000" spc="-1" strike="noStrike">
+                <a:solidFill>
+                  <a:srgbClr val="000000"/>
+                </a:solidFill>
+                <a:latin typeface="Arial"/>
+                <a:ea typeface="DejaVu Sans"/>
+              </a:rPr>
+              <a:t>Market indexes computation.</a:t>
+            </a:r>
+            <a:endParaRPr b="0" lang="it-IT" sz="2000" spc="-1" strike="noStrike">
+              <a:latin typeface="Arial"/>
+            </a:endParaRPr>
+          </a:p>
+          <a:p>
+            <a:pPr marL="285840" indent="-284040">
+              <a:lnSpc>
+                <a:spcPct val="150000"/>
+              </a:lnSpc>
+              <a:buClr>
+                <a:srgbClr val="000000"/>
+              </a:buClr>
+              <a:buFont typeface="Arial"/>
+              <a:buChar char="•"/>
+            </a:pPr>
+            <a:r>
+              <a:rPr b="0" lang="it-IT" sz="2000" spc="-1" strike="noStrike">
+                <a:solidFill>
+                  <a:srgbClr val="000000"/>
+                </a:solidFill>
+                <a:latin typeface="Arial"/>
+                <a:ea typeface="DejaVu Sans"/>
+              </a:rPr>
+              <a:t>Fast and reliable data retrieval and statistics computation.</a:t>
             </a:r>
             <a:endParaRPr b="0" lang="it-IT" sz="2000" spc="-1" strike="noStrike">
               <a:latin typeface="Arial"/>
@@ -5196,7 +5315,7 @@
       </p:grpSpPr>
       <p:sp>
         <p:nvSpPr>
-          <p:cNvPr id="95" name="CustomShape 1"/>
+          <p:cNvPr id="96" name="CustomShape 1"/>
           <p:cNvSpPr/>
           <p:nvPr/>
         </p:nvSpPr>
@@ -5247,7 +5366,7 @@
       </p:sp>
       <p:sp>
         <p:nvSpPr>
-          <p:cNvPr id="96" name="CustomShape 2"/>
+          <p:cNvPr id="97" name="CustomShape 2"/>
           <p:cNvSpPr/>
           <p:nvPr/>
         </p:nvSpPr>
@@ -5411,7 +5530,7 @@
                 <a:latin typeface="Arial"/>
                 <a:ea typeface="DejaVu Sans"/>
               </a:rPr>
-              <a:t>MongoDB (mongodb-driver-sync, official)</a:t>
+              <a:t>MongoDB (MongoDB Driver Sync)</a:t>
             </a:r>
             <a:endParaRPr b="0" lang="it-IT" sz="1800" spc="-1" strike="noStrike">
               <a:latin typeface="Arial"/>
@@ -5454,14 +5573,14 @@
               <a:buChar char="•"/>
             </a:pPr>
             <a:r>
-              <a:rPr b="1" lang="it-IT" sz="1800" spc="-1" strike="noStrike">
+              <a:rPr b="0" lang="it-IT" sz="1800" spc="-1" strike="noStrike">
                 <a:solidFill>
                   <a:srgbClr val="000000"/>
                 </a:solidFill>
                 <a:latin typeface="Arial"/>
                 <a:ea typeface="DejaVu Sans"/>
               </a:rPr>
-              <a:t>TODO: Chart Library</a:t>
+              <a:t>JfreeChart 1.5.1</a:t>
             </a:r>
             <a:endParaRPr b="0" lang="it-IT" sz="1800" spc="-1" strike="noStrike">
               <a:latin typeface="Arial"/>
@@ -5546,7 +5665,7 @@
       </p:sp>
       <p:pic>
         <p:nvPicPr>
-          <p:cNvPr id="97" name="log4j_logo" descr=""/>
+          <p:cNvPr id="98" name="log4j_logo" descr=""/>
           <p:cNvPicPr/>
           <p:nvPr/>
         </p:nvPicPr>
@@ -5569,7 +5688,7 @@
       </p:pic>
       <p:pic>
         <p:nvPicPr>
-          <p:cNvPr id="98" name="cassandra_logo" descr=""/>
+          <p:cNvPr id="99" name="cassandra_logo" descr=""/>
           <p:cNvPicPr/>
           <p:nvPr/>
         </p:nvPicPr>
@@ -5592,7 +5711,7 @@
       </p:pic>
       <p:pic>
         <p:nvPicPr>
-          <p:cNvPr id="99" name="git_logo" descr=""/>
+          <p:cNvPr id="100" name="git_logo" descr=""/>
           <p:cNvPicPr/>
           <p:nvPr/>
         </p:nvPicPr>
@@ -5615,7 +5734,7 @@
       </p:pic>
       <p:pic>
         <p:nvPicPr>
-          <p:cNvPr id="100" name="intellijidea_logo" descr=""/>
+          <p:cNvPr id="101" name="intellijidea_logo" descr=""/>
           <p:cNvPicPr/>
           <p:nvPr/>
         </p:nvPicPr>
@@ -5638,7 +5757,7 @@
       </p:pic>
       <p:pic>
         <p:nvPicPr>
-          <p:cNvPr id="101" name="java_logo" descr=""/>
+          <p:cNvPr id="102" name="java_logo" descr=""/>
           <p:cNvPicPr/>
           <p:nvPr/>
         </p:nvPicPr>
@@ -5661,7 +5780,7 @@
       </p:pic>
       <p:pic>
         <p:nvPicPr>
-          <p:cNvPr id="102" name="JUnit_logo" descr=""/>
+          <p:cNvPr id="103" name="JUnit_logo" descr=""/>
           <p:cNvPicPr/>
           <p:nvPr/>
         </p:nvPicPr>
@@ -5684,7 +5803,7 @@
       </p:pic>
       <p:pic>
         <p:nvPicPr>
-          <p:cNvPr id="103" name="maven_logo" descr=""/>
+          <p:cNvPr id="104" name="maven_logo" descr=""/>
           <p:cNvPicPr/>
           <p:nvPr/>
         </p:nvPicPr>
@@ -5707,7 +5826,7 @@
       </p:pic>
       <p:pic>
         <p:nvPicPr>
-          <p:cNvPr id="104" name="mongodb_logo" descr=""/>
+          <p:cNvPr id="105" name="mongodb_logo" descr=""/>
           <p:cNvPicPr/>
           <p:nvPr/>
         </p:nvPicPr>
@@ -5730,7 +5849,7 @@
       </p:pic>
       <p:pic>
         <p:nvPicPr>
-          <p:cNvPr id="105" name="python_logo" descr=""/>
+          <p:cNvPr id="106" name="python_logo" descr=""/>
           <p:cNvPicPr/>
           <p:nvPr/>
         </p:nvPicPr>
@@ -5753,7 +5872,7 @@
       </p:pic>
       <p:pic>
         <p:nvPicPr>
-          <p:cNvPr id="106" name="yahoofinance_logo" descr=""/>
+          <p:cNvPr id="107" name="yahoofinance_logo" descr=""/>
           <p:cNvPicPr/>
           <p:nvPr/>
         </p:nvPicPr>

</xml_diff>

<commit_message>
Minor fixes on preliminary pptx
</commit_message>
<xml_diff>
--- a/documentation/stocksim_preliminary_presentation.pptx
+++ b/documentation/stocksim_preliminary_presentation.pptx
@@ -4393,8 +4393,8 @@
         </p:nvSpPr>
         <p:spPr>
           <a:xfrm>
-            <a:off x="424440" y="1404360"/>
-            <a:ext cx="8341560" cy="3927960"/>
+            <a:off x="424440" y="1404359"/>
+            <a:ext cx="8341560" cy="4487393"/>
           </a:xfrm>
           <a:prstGeom prst="rect">
             <a:avLst/>
@@ -4422,7 +4422,7 @@
           <a:p>
             <a:pPr marL="285840" indent="-283320">
               <a:lnSpc>
-                <a:spcPct val="115000"/>
+                <a:spcPct val="200000"/>
               </a:lnSpc>
               <a:buClr>
                 <a:srgbClr val="000000"/>
@@ -4617,7 +4617,7 @@
           <a:p>
             <a:pPr marL="285840" indent="-283320">
               <a:lnSpc>
-                <a:spcPct val="150000"/>
+                <a:spcPct val="200000"/>
               </a:lnSpc>
               <a:buClr>
                 <a:srgbClr val="000000"/>
@@ -4682,7 +4682,7 @@
           <a:p>
             <a:pPr marL="285840" indent="-283320">
               <a:lnSpc>
-                <a:spcPct val="150000"/>
+                <a:spcPct val="200000"/>
               </a:lnSpc>
               <a:buClr>
                 <a:srgbClr val="000000"/>
@@ -4718,7 +4718,7 @@
                 <a:latin typeface="Arial"/>
                 <a:ea typeface="DejaVu Sans"/>
               </a:rPr>
-              <a:t> stock charts (Line chart, Bar charts, </a:t>
+              <a:t> stock charts (e.g. Line charts, Bar charts, </a:t>
             </a:r>
             <a:r>
               <a:rPr lang="it-IT" sz="1800" b="0" strike="noStrike" spc="-1" dirty="0" err="1">
@@ -4728,7 +4728,7 @@
                 <a:latin typeface="Arial"/>
                 <a:ea typeface="DejaVu Sans"/>
               </a:rPr>
-              <a:t>Candle</a:t>
+              <a:t>Candlestick</a:t>
             </a:r>
             <a:r>
               <a:rPr lang="it-IT" sz="1800" b="0" strike="noStrike" spc="-1" dirty="0">
@@ -4738,17 +4738,7 @@
                 <a:latin typeface="Arial"/>
                 <a:ea typeface="DejaVu Sans"/>
               </a:rPr>
-              <a:t> and </a:t>
-            </a:r>
-            <a:r>
-              <a:rPr lang="it-IT" sz="1800" b="0" strike="noStrike" spc="-1">
-                <a:solidFill>
-                  <a:srgbClr val="000000"/>
-                </a:solidFill>
-                <a:latin typeface="Arial"/>
-                <a:ea typeface="DejaVu Sans"/>
-              </a:rPr>
-              <a:t>stick charts).</a:t>
+              <a:t> charts).</a:t>
             </a:r>
             <a:endParaRPr lang="it-IT" sz="1800" b="0" strike="noStrike" spc="-1" dirty="0">
               <a:latin typeface="Arial"/>
@@ -4757,7 +4747,7 @@
           <a:p>
             <a:pPr marL="285840" indent="-283320">
               <a:lnSpc>
-                <a:spcPct val="150000"/>
+                <a:spcPct val="200000"/>
               </a:lnSpc>
               <a:buClr>
                 <a:srgbClr val="000000"/>
@@ -4782,7 +4772,7 @@
           <a:p>
             <a:pPr marL="285840" indent="-283320">
               <a:lnSpc>
-                <a:spcPct val="150000"/>
+                <a:spcPct val="200000"/>
               </a:lnSpc>
               <a:buClr>
                 <a:srgbClr val="000000"/>
@@ -4947,7 +4937,7 @@
           <a:p>
             <a:pPr marL="285840" indent="-283320">
               <a:lnSpc>
-                <a:spcPct val="150000"/>
+                <a:spcPct val="200000"/>
               </a:lnSpc>
               <a:buClr>
                 <a:srgbClr val="000000"/>
@@ -5032,7 +5022,7 @@
           <a:p>
             <a:pPr>
               <a:lnSpc>
-                <a:spcPct val="150000"/>
+                <a:spcPct val="200000"/>
               </a:lnSpc>
             </a:pPr>
             <a:endParaRPr lang="it-IT" sz="1800" b="0" strike="noStrike" spc="-1" dirty="0">
@@ -5290,7 +5280,7 @@
         </p:nvSpPr>
         <p:spPr>
           <a:xfrm>
-            <a:off x="387360" y="1139760"/>
+            <a:off x="389160" y="1036065"/>
             <a:ext cx="8346600" cy="5025960"/>
           </a:xfrm>
           <a:prstGeom prst="rect">
@@ -5323,7 +5313,7 @@
               </a:lnSpc>
             </a:pPr>
             <a:r>
-              <a:rPr lang="it-IT" sz="1800" b="1" i="1" strike="noStrike" spc="-1">
+              <a:rPr lang="it-IT" sz="1800" b="1" i="1" strike="noStrike" spc="-1" dirty="0">
                 <a:solidFill>
                   <a:srgbClr val="000000"/>
                 </a:solidFill>
@@ -5332,7 +5322,7 @@
               </a:rPr>
               <a:t>Source:</a:t>
             </a:r>
-            <a:endParaRPr lang="it-IT" sz="1800" b="0" strike="noStrike" spc="-1">
+            <a:endParaRPr lang="it-IT" sz="1800" b="0" strike="noStrike" spc="-1" dirty="0">
               <a:latin typeface="Arial"/>
             </a:endParaRPr>
           </a:p>
@@ -5348,7 +5338,7 @@
               <a:buChar char="o"/>
             </a:pPr>
             <a:r>
-              <a:rPr lang="it-IT" sz="1800" b="0" strike="noStrike" spc="-1">
+              <a:rPr lang="it-IT" sz="1800" b="0" strike="noStrike" spc="-1" dirty="0">
                 <a:solidFill>
                   <a:srgbClr val="000000"/>
                 </a:solidFill>
@@ -5357,7 +5347,7 @@
               </a:rPr>
               <a:t>Yahoo! Finance</a:t>
             </a:r>
-            <a:endParaRPr lang="it-IT" sz="1800" b="0" strike="noStrike" spc="-1">
+            <a:endParaRPr lang="it-IT" sz="1800" b="0" strike="noStrike" spc="-1" dirty="0">
               <a:latin typeface="Arial"/>
             </a:endParaRPr>
           </a:p>
@@ -5373,7 +5363,7 @@
               <a:buChar char="o"/>
             </a:pPr>
             <a:r>
-              <a:rPr lang="it-IT" sz="1800" b="0" strike="noStrike" spc="-1">
+              <a:rPr lang="it-IT" sz="1800" b="0" strike="noStrike" spc="-1" dirty="0" err="1">
                 <a:solidFill>
                   <a:srgbClr val="000000"/>
                 </a:solidFill>
@@ -5382,7 +5372,7 @@
               </a:rPr>
               <a:t>NasdaqTrader</a:t>
             </a:r>
-            <a:endParaRPr lang="it-IT" sz="1800" b="0" strike="noStrike" spc="-1">
+            <a:endParaRPr lang="it-IT" sz="1800" b="0" strike="noStrike" spc="-1" dirty="0">
               <a:latin typeface="Arial"/>
             </a:endParaRPr>
           </a:p>
@@ -5392,7 +5382,7 @@
                 <a:spcPct val="100000"/>
               </a:lnSpc>
             </a:pPr>
-            <a:endParaRPr lang="it-IT" sz="1800" b="0" strike="noStrike" spc="-1">
+            <a:endParaRPr lang="it-IT" sz="1800" b="0" strike="noStrike" spc="-1" dirty="0">
               <a:latin typeface="Arial"/>
             </a:endParaRPr>
           </a:p>
@@ -5403,7 +5393,7 @@
               </a:lnSpc>
             </a:pPr>
             <a:r>
-              <a:rPr lang="it-IT" sz="1800" b="1" i="1" strike="noStrike" spc="-1">
+              <a:rPr lang="it-IT" sz="1800" b="1" i="1" strike="noStrike" spc="-1" dirty="0" err="1">
                 <a:solidFill>
                   <a:srgbClr val="000000"/>
                 </a:solidFill>
@@ -5413,7 +5403,7 @@
               <a:t>Description</a:t>
             </a:r>
             <a:r>
-              <a:rPr lang="it-IT" sz="1800" b="1" strike="noStrike" spc="-1">
+              <a:rPr lang="it-IT" sz="1800" b="1" strike="noStrike" spc="-1" dirty="0">
                 <a:solidFill>
                   <a:srgbClr val="000000"/>
                 </a:solidFill>
@@ -5422,7 +5412,7 @@
               </a:rPr>
               <a:t>:</a:t>
             </a:r>
-            <a:endParaRPr lang="it-IT" sz="1800" b="0" strike="noStrike" spc="-1">
+            <a:endParaRPr lang="it-IT" sz="1800" b="0" strike="noStrike" spc="-1" dirty="0">
               <a:latin typeface="Arial"/>
             </a:endParaRPr>
           </a:p>
@@ -5438,7 +5428,7 @@
               <a:buChar char="o"/>
             </a:pPr>
             <a:r>
-              <a:rPr lang="it-IT" sz="1800" b="1" strike="noStrike" spc="-1">
+              <a:rPr lang="it-IT" sz="1800" b="1" strike="noStrike" spc="-1" dirty="0">
                 <a:solidFill>
                   <a:srgbClr val="000000"/>
                 </a:solidFill>
@@ -5448,16 +5438,296 @@
               <a:t>Yahoo! Finance</a:t>
             </a:r>
             <a:r>
-              <a:rPr lang="it-IT" sz="1800" b="0" strike="noStrike" spc="-1">
-                <a:solidFill>
-                  <a:srgbClr val="000000"/>
-                </a:solidFill>
-                <a:latin typeface="Arial"/>
-                <a:ea typeface="DejaVu Sans"/>
-              </a:rPr>
-              <a:t> is a media property that is part of Yahoo!'s network. It provides financial news, data and commentary including stock quotes, press releases, financial reports, and original content.</a:t>
-            </a:r>
-            <a:endParaRPr lang="it-IT" sz="1800" b="0" strike="noStrike" spc="-1">
+              <a:rPr lang="it-IT" sz="1800" b="0" strike="noStrike" spc="-1" dirty="0">
+                <a:solidFill>
+                  <a:srgbClr val="000000"/>
+                </a:solidFill>
+                <a:latin typeface="Arial"/>
+                <a:ea typeface="DejaVu Sans"/>
+              </a:rPr>
+              <a:t> </a:t>
+            </a:r>
+            <a:r>
+              <a:rPr lang="it-IT" sz="1800" b="0" strike="noStrike" spc="-1" dirty="0" err="1">
+                <a:solidFill>
+                  <a:srgbClr val="000000"/>
+                </a:solidFill>
+                <a:latin typeface="Arial"/>
+                <a:ea typeface="DejaVu Sans"/>
+              </a:rPr>
+              <a:t>is</a:t>
+            </a:r>
+            <a:r>
+              <a:rPr lang="it-IT" sz="1800" b="0" strike="noStrike" spc="-1" dirty="0">
+                <a:solidFill>
+                  <a:srgbClr val="000000"/>
+                </a:solidFill>
+                <a:latin typeface="Arial"/>
+                <a:ea typeface="DejaVu Sans"/>
+              </a:rPr>
+              <a:t> a media </a:t>
+            </a:r>
+            <a:r>
+              <a:rPr lang="it-IT" sz="1800" b="0" strike="noStrike" spc="-1" dirty="0" err="1">
+                <a:solidFill>
+                  <a:srgbClr val="000000"/>
+                </a:solidFill>
+                <a:latin typeface="Arial"/>
+                <a:ea typeface="DejaVu Sans"/>
+              </a:rPr>
+              <a:t>property</a:t>
+            </a:r>
+            <a:r>
+              <a:rPr lang="it-IT" sz="1800" b="0" strike="noStrike" spc="-1" dirty="0">
+                <a:solidFill>
+                  <a:srgbClr val="000000"/>
+                </a:solidFill>
+                <a:latin typeface="Arial"/>
+                <a:ea typeface="DejaVu Sans"/>
+              </a:rPr>
+              <a:t> </a:t>
+            </a:r>
+            <a:r>
+              <a:rPr lang="it-IT" sz="1800" b="0" strike="noStrike" spc="-1" dirty="0" err="1">
+                <a:solidFill>
+                  <a:srgbClr val="000000"/>
+                </a:solidFill>
+                <a:latin typeface="Arial"/>
+                <a:ea typeface="DejaVu Sans"/>
+              </a:rPr>
+              <a:t>that</a:t>
+            </a:r>
+            <a:r>
+              <a:rPr lang="it-IT" sz="1800" b="0" strike="noStrike" spc="-1" dirty="0">
+                <a:solidFill>
+                  <a:srgbClr val="000000"/>
+                </a:solidFill>
+                <a:latin typeface="Arial"/>
+                <a:ea typeface="DejaVu Sans"/>
+              </a:rPr>
+              <a:t> </a:t>
+            </a:r>
+            <a:r>
+              <a:rPr lang="it-IT" sz="1800" b="0" strike="noStrike" spc="-1" dirty="0" err="1">
+                <a:solidFill>
+                  <a:srgbClr val="000000"/>
+                </a:solidFill>
+                <a:latin typeface="Arial"/>
+                <a:ea typeface="DejaVu Sans"/>
+              </a:rPr>
+              <a:t>is</a:t>
+            </a:r>
+            <a:r>
+              <a:rPr lang="it-IT" sz="1800" b="0" strike="noStrike" spc="-1" dirty="0">
+                <a:solidFill>
+                  <a:srgbClr val="000000"/>
+                </a:solidFill>
+                <a:latin typeface="Arial"/>
+                <a:ea typeface="DejaVu Sans"/>
+              </a:rPr>
+              <a:t> part of </a:t>
+            </a:r>
+            <a:r>
+              <a:rPr lang="it-IT" sz="1800" b="0" strike="noStrike" spc="-1" dirty="0" err="1">
+                <a:solidFill>
+                  <a:srgbClr val="000000"/>
+                </a:solidFill>
+                <a:latin typeface="Arial"/>
+                <a:ea typeface="DejaVu Sans"/>
+              </a:rPr>
+              <a:t>Yahoo!'s</a:t>
+            </a:r>
+            <a:r>
+              <a:rPr lang="it-IT" sz="1800" b="0" strike="noStrike" spc="-1" dirty="0">
+                <a:solidFill>
+                  <a:srgbClr val="000000"/>
+                </a:solidFill>
+                <a:latin typeface="Arial"/>
+                <a:ea typeface="DejaVu Sans"/>
+              </a:rPr>
+              <a:t> network. </a:t>
+            </a:r>
+            <a:r>
+              <a:rPr lang="it-IT" sz="1800" b="0" strike="noStrike" spc="-1" dirty="0" err="1">
+                <a:solidFill>
+                  <a:srgbClr val="000000"/>
+                </a:solidFill>
+                <a:latin typeface="Arial"/>
+                <a:ea typeface="DejaVu Sans"/>
+              </a:rPr>
+              <a:t>It</a:t>
+            </a:r>
+            <a:r>
+              <a:rPr lang="it-IT" sz="1800" b="0" strike="noStrike" spc="-1" dirty="0">
+                <a:solidFill>
+                  <a:srgbClr val="000000"/>
+                </a:solidFill>
+                <a:latin typeface="Arial"/>
+                <a:ea typeface="DejaVu Sans"/>
+              </a:rPr>
+              <a:t> </a:t>
+            </a:r>
+            <a:r>
+              <a:rPr lang="it-IT" sz="1800" b="0" strike="noStrike" spc="-1" dirty="0" err="1">
+                <a:solidFill>
+                  <a:srgbClr val="000000"/>
+                </a:solidFill>
+                <a:latin typeface="Arial"/>
+                <a:ea typeface="DejaVu Sans"/>
+              </a:rPr>
+              <a:t>provides</a:t>
+            </a:r>
+            <a:r>
+              <a:rPr lang="it-IT" sz="1800" b="0" strike="noStrike" spc="-1" dirty="0">
+                <a:solidFill>
+                  <a:srgbClr val="000000"/>
+                </a:solidFill>
+                <a:latin typeface="Arial"/>
+                <a:ea typeface="DejaVu Sans"/>
+              </a:rPr>
+              <a:t> </a:t>
+            </a:r>
+            <a:r>
+              <a:rPr lang="it-IT" sz="1800" b="0" strike="noStrike" spc="-1" dirty="0" err="1">
+                <a:solidFill>
+                  <a:srgbClr val="000000"/>
+                </a:solidFill>
+                <a:latin typeface="Arial"/>
+                <a:ea typeface="DejaVu Sans"/>
+              </a:rPr>
+              <a:t>financial</a:t>
+            </a:r>
+            <a:r>
+              <a:rPr lang="it-IT" sz="1800" b="0" strike="noStrike" spc="-1" dirty="0">
+                <a:solidFill>
+                  <a:srgbClr val="000000"/>
+                </a:solidFill>
+                <a:latin typeface="Arial"/>
+                <a:ea typeface="DejaVu Sans"/>
+              </a:rPr>
+              <a:t> news, data and </a:t>
+            </a:r>
+            <a:r>
+              <a:rPr lang="it-IT" sz="1800" b="0" strike="noStrike" spc="-1" dirty="0" err="1">
+                <a:solidFill>
+                  <a:srgbClr val="000000"/>
+                </a:solidFill>
+                <a:latin typeface="Arial"/>
+                <a:ea typeface="DejaVu Sans"/>
+              </a:rPr>
+              <a:t>commentary</a:t>
+            </a:r>
+            <a:r>
+              <a:rPr lang="it-IT" sz="1800" b="0" strike="noStrike" spc="-1" dirty="0">
+                <a:solidFill>
+                  <a:srgbClr val="000000"/>
+                </a:solidFill>
+                <a:latin typeface="Arial"/>
+                <a:ea typeface="DejaVu Sans"/>
+              </a:rPr>
+              <a:t> </a:t>
+            </a:r>
+            <a:r>
+              <a:rPr lang="it-IT" sz="1800" b="0" strike="noStrike" spc="-1" dirty="0" err="1">
+                <a:solidFill>
+                  <a:srgbClr val="000000"/>
+                </a:solidFill>
+                <a:latin typeface="Arial"/>
+                <a:ea typeface="DejaVu Sans"/>
+              </a:rPr>
+              <a:t>including</a:t>
+            </a:r>
+            <a:r>
+              <a:rPr lang="it-IT" sz="1800" b="0" strike="noStrike" spc="-1" dirty="0">
+                <a:solidFill>
+                  <a:srgbClr val="000000"/>
+                </a:solidFill>
+                <a:latin typeface="Arial"/>
+                <a:ea typeface="DejaVu Sans"/>
+              </a:rPr>
+              <a:t> stock </a:t>
+            </a:r>
+            <a:r>
+              <a:rPr lang="it-IT" sz="1800" b="0" strike="noStrike" spc="-1" dirty="0" err="1">
+                <a:solidFill>
+                  <a:srgbClr val="000000"/>
+                </a:solidFill>
+                <a:latin typeface="Arial"/>
+                <a:ea typeface="DejaVu Sans"/>
+              </a:rPr>
+              <a:t>quotes</a:t>
+            </a:r>
+            <a:r>
+              <a:rPr lang="it-IT" sz="1800" b="0" strike="noStrike" spc="-1" dirty="0">
+                <a:solidFill>
+                  <a:srgbClr val="000000"/>
+                </a:solidFill>
+                <a:latin typeface="Arial"/>
+                <a:ea typeface="DejaVu Sans"/>
+              </a:rPr>
+              <a:t>, press releases, </a:t>
+            </a:r>
+            <a:r>
+              <a:rPr lang="it-IT" sz="1800" b="0" strike="noStrike" spc="-1" dirty="0" err="1">
+                <a:solidFill>
+                  <a:srgbClr val="000000"/>
+                </a:solidFill>
+                <a:latin typeface="Arial"/>
+                <a:ea typeface="DejaVu Sans"/>
+              </a:rPr>
+              <a:t>financial</a:t>
+            </a:r>
+            <a:r>
+              <a:rPr lang="it-IT" sz="1800" b="0" strike="noStrike" spc="-1" dirty="0">
+                <a:solidFill>
+                  <a:srgbClr val="000000"/>
+                </a:solidFill>
+                <a:latin typeface="Arial"/>
+                <a:ea typeface="DejaVu Sans"/>
+              </a:rPr>
+              <a:t> reports, and </a:t>
+            </a:r>
+            <a:r>
+              <a:rPr lang="it-IT" sz="1800" b="0" strike="noStrike" spc="-1" dirty="0" err="1">
+                <a:solidFill>
+                  <a:srgbClr val="000000"/>
+                </a:solidFill>
+                <a:latin typeface="Arial"/>
+                <a:ea typeface="DejaVu Sans"/>
+              </a:rPr>
+              <a:t>original</a:t>
+            </a:r>
+            <a:r>
+              <a:rPr lang="it-IT" sz="1800" b="0" strike="noStrike" spc="-1" dirty="0">
+                <a:solidFill>
+                  <a:srgbClr val="000000"/>
+                </a:solidFill>
+                <a:latin typeface="Arial"/>
+                <a:ea typeface="DejaVu Sans"/>
+              </a:rPr>
+              <a:t> </a:t>
+            </a:r>
+            <a:r>
+              <a:rPr lang="it-IT" sz="1800" b="0" strike="noStrike" spc="-1" dirty="0" err="1">
+                <a:solidFill>
+                  <a:srgbClr val="000000"/>
+                </a:solidFill>
+                <a:latin typeface="Arial"/>
+                <a:ea typeface="DejaVu Sans"/>
+              </a:rPr>
+              <a:t>content</a:t>
+            </a:r>
+            <a:r>
+              <a:rPr lang="it-IT" sz="1800" b="0" strike="noStrike" spc="-1" dirty="0">
+                <a:solidFill>
+                  <a:srgbClr val="000000"/>
+                </a:solidFill>
+                <a:latin typeface="Arial"/>
+                <a:ea typeface="DejaVu Sans"/>
+              </a:rPr>
+              <a:t>.</a:t>
+            </a:r>
+            <a:endParaRPr lang="it-IT" sz="1800" b="0" strike="noStrike" spc="-1" dirty="0">
               <a:latin typeface="Arial"/>
             </a:endParaRPr>
           </a:p>
@@ -5473,7 +5743,7 @@
               <a:buChar char="o"/>
             </a:pPr>
             <a:r>
-              <a:rPr lang="it-IT" sz="1800" b="1" strike="noStrike" spc="-1">
+              <a:rPr lang="it-IT" sz="1800" b="1" strike="noStrike" spc="-1" dirty="0" err="1">
                 <a:solidFill>
                   <a:srgbClr val="000000"/>
                 </a:solidFill>
@@ -5483,16 +5753,116 @@
               <a:t>NasdaqTrader</a:t>
             </a:r>
             <a:r>
-              <a:rPr lang="it-IT" sz="1800" b="0" strike="noStrike" spc="-1">
-                <a:solidFill>
-                  <a:srgbClr val="000000"/>
-                </a:solidFill>
-                <a:latin typeface="Arial"/>
-                <a:ea typeface="DejaVu Sans"/>
-              </a:rPr>
-              <a:t> is a website that covers the Nasdaq market providing proprietary access to trading liquidity.</a:t>
-            </a:r>
-            <a:endParaRPr lang="it-IT" sz="1800" b="0" strike="noStrike" spc="-1">
+              <a:rPr lang="it-IT" sz="1800" b="0" strike="noStrike" spc="-1" dirty="0">
+                <a:solidFill>
+                  <a:srgbClr val="000000"/>
+                </a:solidFill>
+                <a:latin typeface="Arial"/>
+                <a:ea typeface="DejaVu Sans"/>
+              </a:rPr>
+              <a:t> </a:t>
+            </a:r>
+            <a:r>
+              <a:rPr lang="it-IT" sz="1800" b="0" strike="noStrike" spc="-1" dirty="0" err="1">
+                <a:solidFill>
+                  <a:srgbClr val="000000"/>
+                </a:solidFill>
+                <a:latin typeface="Arial"/>
+                <a:ea typeface="DejaVu Sans"/>
+              </a:rPr>
+              <a:t>is</a:t>
+            </a:r>
+            <a:r>
+              <a:rPr lang="it-IT" sz="1800" b="0" strike="noStrike" spc="-1" dirty="0">
+                <a:solidFill>
+                  <a:srgbClr val="000000"/>
+                </a:solidFill>
+                <a:latin typeface="Arial"/>
+                <a:ea typeface="DejaVu Sans"/>
+              </a:rPr>
+              <a:t> a website </a:t>
+            </a:r>
+            <a:r>
+              <a:rPr lang="it-IT" sz="1800" b="0" strike="noStrike" spc="-1" dirty="0" err="1">
+                <a:solidFill>
+                  <a:srgbClr val="000000"/>
+                </a:solidFill>
+                <a:latin typeface="Arial"/>
+                <a:ea typeface="DejaVu Sans"/>
+              </a:rPr>
+              <a:t>that</a:t>
+            </a:r>
+            <a:r>
+              <a:rPr lang="it-IT" sz="1800" b="0" strike="noStrike" spc="-1" dirty="0">
+                <a:solidFill>
+                  <a:srgbClr val="000000"/>
+                </a:solidFill>
+                <a:latin typeface="Arial"/>
+                <a:ea typeface="DejaVu Sans"/>
+              </a:rPr>
+              <a:t> covers the Nasdaq market </a:t>
+            </a:r>
+            <a:r>
+              <a:rPr lang="it-IT" sz="1800" b="0" strike="noStrike" spc="-1" dirty="0" err="1">
+                <a:solidFill>
+                  <a:srgbClr val="000000"/>
+                </a:solidFill>
+                <a:latin typeface="Arial"/>
+                <a:ea typeface="DejaVu Sans"/>
+              </a:rPr>
+              <a:t>providing</a:t>
+            </a:r>
+            <a:r>
+              <a:rPr lang="it-IT" sz="1800" b="0" strike="noStrike" spc="-1" dirty="0">
+                <a:solidFill>
+                  <a:srgbClr val="000000"/>
+                </a:solidFill>
+                <a:latin typeface="Arial"/>
+                <a:ea typeface="DejaVu Sans"/>
+              </a:rPr>
+              <a:t> </a:t>
+            </a:r>
+            <a:r>
+              <a:rPr lang="it-IT" sz="1800" b="0" strike="noStrike" spc="-1" dirty="0" err="1">
+                <a:solidFill>
+                  <a:srgbClr val="000000"/>
+                </a:solidFill>
+                <a:latin typeface="Arial"/>
+                <a:ea typeface="DejaVu Sans"/>
+              </a:rPr>
+              <a:t>proprietary</a:t>
+            </a:r>
+            <a:r>
+              <a:rPr lang="it-IT" sz="1800" b="0" strike="noStrike" spc="-1" dirty="0">
+                <a:solidFill>
+                  <a:srgbClr val="000000"/>
+                </a:solidFill>
+                <a:latin typeface="Arial"/>
+                <a:ea typeface="DejaVu Sans"/>
+              </a:rPr>
+              <a:t> access to trading </a:t>
+            </a:r>
+            <a:r>
+              <a:rPr lang="it-IT" sz="1800" b="0" strike="noStrike" spc="-1" dirty="0" err="1">
+                <a:solidFill>
+                  <a:srgbClr val="000000"/>
+                </a:solidFill>
+                <a:latin typeface="Arial"/>
+                <a:ea typeface="DejaVu Sans"/>
+              </a:rPr>
+              <a:t>liquidity</a:t>
+            </a:r>
+            <a:r>
+              <a:rPr lang="it-IT" sz="1800" b="0" strike="noStrike" spc="-1" dirty="0">
+                <a:solidFill>
+                  <a:srgbClr val="000000"/>
+                </a:solidFill>
+                <a:latin typeface="Arial"/>
+                <a:ea typeface="DejaVu Sans"/>
+              </a:rPr>
+              <a:t>.</a:t>
+            </a:r>
+            <a:endParaRPr lang="it-IT" sz="1800" b="0" strike="noStrike" spc="-1" dirty="0">
               <a:latin typeface="Arial"/>
             </a:endParaRPr>
           </a:p>
@@ -5502,7 +5872,7 @@
                 <a:spcPct val="100000"/>
               </a:lnSpc>
             </a:pPr>
-            <a:endParaRPr lang="it-IT" sz="1800" b="0" strike="noStrike" spc="-1">
+            <a:endParaRPr lang="it-IT" sz="1800" b="0" strike="noStrike" spc="-1" dirty="0">
               <a:latin typeface="Arial"/>
             </a:endParaRPr>
           </a:p>
@@ -5513,7 +5883,7 @@
               </a:lnSpc>
             </a:pPr>
             <a:r>
-              <a:rPr lang="it-IT" sz="1800" b="1" i="1" strike="noStrike" spc="-1">
+              <a:rPr lang="it-IT" sz="1800" b="1" i="1" strike="noStrike" spc="-1" dirty="0">
                 <a:solidFill>
                   <a:srgbClr val="000000"/>
                 </a:solidFill>
@@ -5523,7 +5893,7 @@
               <a:t>Volume: </a:t>
             </a:r>
             <a:r>
-              <a:rPr lang="it-IT" sz="1800" b="0" strike="noStrike" spc="-1">
+              <a:rPr lang="it-IT" sz="1800" b="0" strike="noStrike" spc="-1" dirty="0">
                 <a:solidFill>
                   <a:srgbClr val="000000"/>
                 </a:solidFill>
@@ -5532,7 +5902,7 @@
               </a:rPr>
               <a:t>~ 2.7 GB</a:t>
             </a:r>
-            <a:endParaRPr lang="it-IT" sz="1800" b="0" strike="noStrike" spc="-1">
+            <a:endParaRPr lang="it-IT" sz="1800" b="0" strike="noStrike" spc="-1" dirty="0">
               <a:latin typeface="Arial"/>
             </a:endParaRPr>
           </a:p>
@@ -5542,7 +5912,7 @@
                 <a:spcPct val="100000"/>
               </a:lnSpc>
             </a:pPr>
-            <a:endParaRPr lang="it-IT" sz="1800" b="0" strike="noStrike" spc="-1">
+            <a:endParaRPr lang="it-IT" sz="1800" b="0" strike="noStrike" spc="-1" dirty="0">
               <a:latin typeface="Arial"/>
             </a:endParaRPr>
           </a:p>
@@ -5553,7 +5923,7 @@
               </a:lnSpc>
             </a:pPr>
             <a:r>
-              <a:rPr lang="it-IT" sz="1800" b="1" i="1" strike="noStrike" spc="-1">
+              <a:rPr lang="it-IT" sz="1800" b="1" i="1" strike="noStrike" spc="-1" dirty="0" err="1">
                 <a:solidFill>
                   <a:srgbClr val="000000"/>
                 </a:solidFill>
@@ -5563,16 +5933,76 @@
               <a:t>Variety</a:t>
             </a:r>
             <a:r>
-              <a:rPr lang="it-IT" sz="1800" b="0" strike="noStrike" spc="-1">
-                <a:solidFill>
-                  <a:srgbClr val="000000"/>
-                </a:solidFill>
-                <a:latin typeface="Arial"/>
-                <a:ea typeface="DejaVu Sans"/>
-              </a:rPr>
-              <a:t>: granted by the heterogeneous composition of the U.S. stock market stocks.</a:t>
-            </a:r>
-            <a:endParaRPr lang="it-IT" sz="1800" b="0" strike="noStrike" spc="-1">
+              <a:rPr lang="it-IT" sz="1800" b="0" strike="noStrike" spc="-1" dirty="0">
+                <a:solidFill>
+                  <a:srgbClr val="000000"/>
+                </a:solidFill>
+                <a:latin typeface="Arial"/>
+                <a:ea typeface="DejaVu Sans"/>
+              </a:rPr>
+              <a:t>: </a:t>
+            </a:r>
+            <a:r>
+              <a:rPr lang="it-IT" sz="1800" b="0" strike="noStrike" spc="-1" dirty="0" err="1">
+                <a:solidFill>
+                  <a:srgbClr val="000000"/>
+                </a:solidFill>
+                <a:latin typeface="Arial"/>
+                <a:ea typeface="DejaVu Sans"/>
+              </a:rPr>
+              <a:t>granted</a:t>
+            </a:r>
+            <a:r>
+              <a:rPr lang="it-IT" sz="1800" b="0" strike="noStrike" spc="-1" dirty="0">
+                <a:solidFill>
+                  <a:srgbClr val="000000"/>
+                </a:solidFill>
+                <a:latin typeface="Arial"/>
+                <a:ea typeface="DejaVu Sans"/>
+              </a:rPr>
+              <a:t> by the </a:t>
+            </a:r>
+            <a:r>
+              <a:rPr lang="it-IT" sz="1800" b="0" strike="noStrike" spc="-1" dirty="0" err="1">
+                <a:solidFill>
+                  <a:srgbClr val="000000"/>
+                </a:solidFill>
+                <a:latin typeface="Arial"/>
+                <a:ea typeface="DejaVu Sans"/>
+              </a:rPr>
+              <a:t>heterogeneous</a:t>
+            </a:r>
+            <a:r>
+              <a:rPr lang="it-IT" sz="1800" b="0" strike="noStrike" spc="-1" dirty="0">
+                <a:solidFill>
+                  <a:srgbClr val="000000"/>
+                </a:solidFill>
+                <a:latin typeface="Arial"/>
+                <a:ea typeface="DejaVu Sans"/>
+              </a:rPr>
+              <a:t> </a:t>
+            </a:r>
+            <a:r>
+              <a:rPr lang="it-IT" sz="1800" b="0" strike="noStrike" spc="-1" dirty="0" err="1">
+                <a:solidFill>
+                  <a:srgbClr val="000000"/>
+                </a:solidFill>
+                <a:latin typeface="Arial"/>
+                <a:ea typeface="DejaVu Sans"/>
+              </a:rPr>
+              <a:t>composition</a:t>
+            </a:r>
+            <a:r>
+              <a:rPr lang="it-IT" sz="1800" b="0" strike="noStrike" spc="-1" dirty="0">
+                <a:solidFill>
+                  <a:srgbClr val="000000"/>
+                </a:solidFill>
+                <a:latin typeface="Arial"/>
+                <a:ea typeface="DejaVu Sans"/>
+              </a:rPr>
+              <a:t> of the U.S. stock market stocks.</a:t>
+            </a:r>
+            <a:endParaRPr lang="it-IT" sz="1800" b="0" strike="noStrike" spc="-1" dirty="0">
               <a:latin typeface="Arial"/>
             </a:endParaRPr>
           </a:p>
@@ -5582,7 +6012,7 @@
                 <a:spcPct val="100000"/>
               </a:lnSpc>
             </a:pPr>
-            <a:endParaRPr lang="it-IT" sz="1800" b="0" strike="noStrike" spc="-1">
+            <a:endParaRPr lang="it-IT" sz="1800" b="0" strike="noStrike" spc="-1" dirty="0">
               <a:latin typeface="Arial"/>
             </a:endParaRPr>
           </a:p>
@@ -5593,26 +6023,146 @@
               </a:lnSpc>
             </a:pPr>
             <a:r>
-              <a:rPr lang="it-IT" sz="1800" b="1" i="1" strike="noStrike" spc="-1">
-                <a:solidFill>
-                  <a:srgbClr val="000000"/>
-                </a:solidFill>
-                <a:latin typeface="Arial"/>
-                <a:ea typeface="DejaVu Sans"/>
-              </a:rPr>
-              <a:t>Velocity/Variability</a:t>
-            </a:r>
-            <a:r>
-              <a:rPr lang="it-IT" sz="1800" b="0" strike="noStrike" spc="-1">
-                <a:solidFill>
-                  <a:srgbClr val="000000"/>
-                </a:solidFill>
-                <a:latin typeface="Arial"/>
-                <a:ea typeface="DejaVu Sans"/>
-              </a:rPr>
-              <a:t>: indices and shares of each of the 8000+ U.S. stock market stocks are updated automatically every day.</a:t>
-            </a:r>
-            <a:endParaRPr lang="it-IT" sz="1800" b="0" strike="noStrike" spc="-1">
+              <a:rPr lang="it-IT" sz="1800" b="1" i="1" strike="noStrike" spc="-1" dirty="0" err="1">
+                <a:solidFill>
+                  <a:srgbClr val="000000"/>
+                </a:solidFill>
+                <a:latin typeface="Arial"/>
+                <a:ea typeface="DejaVu Sans"/>
+              </a:rPr>
+              <a:t>Velocity</a:t>
+            </a:r>
+            <a:r>
+              <a:rPr lang="it-IT" sz="1800" b="1" i="1" strike="noStrike" spc="-1" dirty="0">
+                <a:solidFill>
+                  <a:srgbClr val="000000"/>
+                </a:solidFill>
+                <a:latin typeface="Arial"/>
+                <a:ea typeface="DejaVu Sans"/>
+              </a:rPr>
+              <a:t>/</a:t>
+            </a:r>
+            <a:r>
+              <a:rPr lang="it-IT" sz="1800" b="1" i="1" strike="noStrike" spc="-1" dirty="0" err="1">
+                <a:solidFill>
+                  <a:srgbClr val="000000"/>
+                </a:solidFill>
+                <a:latin typeface="Arial"/>
+                <a:ea typeface="DejaVu Sans"/>
+              </a:rPr>
+              <a:t>Variability</a:t>
+            </a:r>
+            <a:r>
+              <a:rPr lang="it-IT" sz="1800" b="0" strike="noStrike" spc="-1" dirty="0">
+                <a:solidFill>
+                  <a:srgbClr val="000000"/>
+                </a:solidFill>
+                <a:latin typeface="Arial"/>
+                <a:ea typeface="DejaVu Sans"/>
+              </a:rPr>
+              <a:t>: </a:t>
+            </a:r>
+            <a:r>
+              <a:rPr lang="it-IT" sz="1800" b="0" strike="noStrike" spc="-1" dirty="0" err="1">
+                <a:solidFill>
+                  <a:srgbClr val="000000"/>
+                </a:solidFill>
+                <a:latin typeface="Arial"/>
+                <a:ea typeface="DejaVu Sans"/>
+              </a:rPr>
+              <a:t>indices</a:t>
+            </a:r>
+            <a:r>
+              <a:rPr lang="it-IT" sz="1800" b="0" strike="noStrike" spc="-1" dirty="0">
+                <a:solidFill>
+                  <a:srgbClr val="000000"/>
+                </a:solidFill>
+                <a:latin typeface="Arial"/>
+                <a:ea typeface="DejaVu Sans"/>
+              </a:rPr>
+              <a:t> and shares of </a:t>
+            </a:r>
+            <a:r>
+              <a:rPr lang="it-IT" sz="1800" b="0" strike="noStrike" spc="-1" dirty="0" err="1">
+                <a:solidFill>
+                  <a:srgbClr val="000000"/>
+                </a:solidFill>
+                <a:latin typeface="Arial"/>
+                <a:ea typeface="DejaVu Sans"/>
+              </a:rPr>
+              <a:t>each</a:t>
+            </a:r>
+            <a:r>
+              <a:rPr lang="it-IT" sz="1800" b="0" strike="noStrike" spc="-1" dirty="0">
+                <a:solidFill>
+                  <a:srgbClr val="000000"/>
+                </a:solidFill>
+                <a:latin typeface="Arial"/>
+                <a:ea typeface="DejaVu Sans"/>
+              </a:rPr>
+              <a:t> of the 8000+ U.S. stock market stocks are </a:t>
+            </a:r>
+            <a:r>
+              <a:rPr lang="it-IT" sz="1800" b="0" strike="noStrike" spc="-1" dirty="0" err="1">
+                <a:solidFill>
+                  <a:srgbClr val="000000"/>
+                </a:solidFill>
+                <a:latin typeface="Arial"/>
+                <a:ea typeface="DejaVu Sans"/>
+              </a:rPr>
+              <a:t>updated</a:t>
+            </a:r>
+            <a:r>
+              <a:rPr lang="it-IT" sz="1800" b="0" strike="noStrike" spc="-1" dirty="0">
+                <a:solidFill>
+                  <a:srgbClr val="000000"/>
+                </a:solidFill>
+                <a:latin typeface="Arial"/>
+                <a:ea typeface="DejaVu Sans"/>
+              </a:rPr>
+              <a:t> </a:t>
+            </a:r>
+            <a:r>
+              <a:rPr lang="it-IT" sz="1800" b="0" strike="noStrike" spc="-1" dirty="0" err="1">
+                <a:solidFill>
+                  <a:srgbClr val="000000"/>
+                </a:solidFill>
+                <a:latin typeface="Arial"/>
+                <a:ea typeface="DejaVu Sans"/>
+              </a:rPr>
+              <a:t>automatically</a:t>
+            </a:r>
+            <a:r>
+              <a:rPr lang="it-IT" sz="1800" b="0" strike="noStrike" spc="-1" dirty="0">
+                <a:solidFill>
+                  <a:srgbClr val="000000"/>
+                </a:solidFill>
+                <a:latin typeface="Arial"/>
+                <a:ea typeface="DejaVu Sans"/>
+              </a:rPr>
+              <a:t> </a:t>
+            </a:r>
+            <a:r>
+              <a:rPr lang="it-IT" sz="1800" b="0" strike="noStrike" spc="-1" dirty="0" err="1">
+                <a:solidFill>
+                  <a:srgbClr val="000000"/>
+                </a:solidFill>
+                <a:latin typeface="Arial"/>
+                <a:ea typeface="DejaVu Sans"/>
+              </a:rPr>
+              <a:t>every</a:t>
+            </a:r>
+            <a:r>
+              <a:rPr lang="it-IT" sz="1800" b="0" strike="noStrike" spc="-1" dirty="0">
+                <a:solidFill>
+                  <a:srgbClr val="000000"/>
+                </a:solidFill>
+                <a:latin typeface="Arial"/>
+                <a:ea typeface="DejaVu Sans"/>
+              </a:rPr>
+              <a:t> day.</a:t>
+            </a:r>
+            <a:endParaRPr lang="it-IT" sz="1800" b="0" strike="noStrike" spc="-1" dirty="0">
               <a:latin typeface="Arial"/>
             </a:endParaRPr>
           </a:p>
@@ -5622,7 +6172,7 @@
                 <a:spcPct val="100000"/>
               </a:lnSpc>
             </a:pPr>
-            <a:endParaRPr lang="it-IT" sz="1800" b="0" strike="noStrike" spc="-1">
+            <a:endParaRPr lang="it-IT" sz="1800" b="0" strike="noStrike" spc="-1" dirty="0">
               <a:latin typeface="Arial"/>
             </a:endParaRPr>
           </a:p>
@@ -5889,7 +6439,7 @@
         <p:spPr>
           <a:xfrm>
             <a:off x="411840" y="1436760"/>
-            <a:ext cx="8317440" cy="3746520"/>
+            <a:ext cx="8317440" cy="4285310"/>
           </a:xfrm>
           <a:prstGeom prst="rect">
             <a:avLst/>
@@ -5917,7 +6467,7 @@
           <a:p>
             <a:pPr marL="285840" indent="-283320">
               <a:lnSpc>
-                <a:spcPct val="115000"/>
+                <a:spcPct val="140000"/>
               </a:lnSpc>
               <a:buClr>
                 <a:srgbClr val="000000"/>
@@ -5926,23 +6476,43 @@
               <a:buChar char="•"/>
             </a:pPr>
             <a:r>
-              <a:rPr lang="it-IT" sz="2400" b="0" strike="noStrike" spc="-1">
-                <a:solidFill>
-                  <a:srgbClr val="000000"/>
-                </a:solidFill>
-                <a:latin typeface="Arial"/>
-                <a:ea typeface="DejaVu Sans"/>
-              </a:rPr>
-              <a:t>Users’ authentication, personal information and preferences.</a:t>
-            </a:r>
-            <a:endParaRPr lang="it-IT" sz="2400" b="0" strike="noStrike" spc="-1">
+              <a:rPr lang="it-IT" sz="2400" b="0" strike="noStrike" spc="-1" dirty="0">
+                <a:solidFill>
+                  <a:srgbClr val="000000"/>
+                </a:solidFill>
+                <a:latin typeface="Arial"/>
+                <a:ea typeface="DejaVu Sans"/>
+              </a:rPr>
+              <a:t>Users’ authentication, personal information and </a:t>
+            </a:r>
+            <a:r>
+              <a:rPr lang="it-IT" sz="2400" b="0" strike="noStrike" spc="-1" dirty="0" err="1">
+                <a:solidFill>
+                  <a:srgbClr val="000000"/>
+                </a:solidFill>
+                <a:latin typeface="Arial"/>
+                <a:ea typeface="DejaVu Sans"/>
+              </a:rPr>
+              <a:t>preferences</a:t>
+            </a:r>
+            <a:r>
+              <a:rPr lang="it-IT" sz="2400" b="0" strike="noStrike" spc="-1" dirty="0">
+                <a:solidFill>
+                  <a:srgbClr val="000000"/>
+                </a:solidFill>
+                <a:latin typeface="Arial"/>
+                <a:ea typeface="DejaVu Sans"/>
+              </a:rPr>
+              <a:t>.</a:t>
+            </a:r>
+            <a:endParaRPr lang="it-IT" sz="2400" b="0" strike="noStrike" spc="-1" dirty="0">
               <a:latin typeface="Arial"/>
             </a:endParaRPr>
           </a:p>
           <a:p>
             <a:pPr marL="285840" indent="-283320">
               <a:lnSpc>
-                <a:spcPct val="115000"/>
+                <a:spcPct val="140000"/>
               </a:lnSpc>
               <a:buClr>
                 <a:srgbClr val="000000"/>
@@ -5951,23 +6521,83 @@
               <a:buChar char="•"/>
             </a:pPr>
             <a:r>
-              <a:rPr lang="it-IT" sz="2400" b="0" strike="noStrike" spc="-1">
-                <a:solidFill>
-                  <a:srgbClr val="000000"/>
-                </a:solidFill>
-                <a:latin typeface="Arial"/>
-                <a:ea typeface="DejaVu Sans"/>
-              </a:rPr>
-              <a:t>Stocks’ information (company details, trade, capitalization, etc…).</a:t>
-            </a:r>
-            <a:endParaRPr lang="it-IT" sz="2400" b="0" strike="noStrike" spc="-1">
+              <a:rPr lang="it-IT" sz="2400" b="0" strike="noStrike" spc="-1" dirty="0">
+                <a:solidFill>
+                  <a:srgbClr val="000000"/>
+                </a:solidFill>
+                <a:latin typeface="Arial"/>
+                <a:ea typeface="DejaVu Sans"/>
+              </a:rPr>
+              <a:t>Stocks’ information (company </a:t>
+            </a:r>
+            <a:r>
+              <a:rPr lang="it-IT" sz="2400" b="0" strike="noStrike" spc="-1" dirty="0" err="1">
+                <a:solidFill>
+                  <a:srgbClr val="000000"/>
+                </a:solidFill>
+                <a:latin typeface="Arial"/>
+                <a:ea typeface="DejaVu Sans"/>
+              </a:rPr>
+              <a:t>details</a:t>
+            </a:r>
+            <a:r>
+              <a:rPr lang="it-IT" sz="2400" b="0" strike="noStrike" spc="-1" dirty="0">
+                <a:solidFill>
+                  <a:srgbClr val="000000"/>
+                </a:solidFill>
+                <a:latin typeface="Arial"/>
+                <a:ea typeface="DejaVu Sans"/>
+              </a:rPr>
+              <a:t>, trade, </a:t>
+            </a:r>
+            <a:r>
+              <a:rPr lang="it-IT" sz="2400" b="0" strike="noStrike" spc="-1" dirty="0" err="1">
+                <a:solidFill>
+                  <a:srgbClr val="000000"/>
+                </a:solidFill>
+                <a:latin typeface="Arial"/>
+                <a:ea typeface="DejaVu Sans"/>
+              </a:rPr>
+              <a:t>capitalization</a:t>
+            </a:r>
+            <a:r>
+              <a:rPr lang="it-IT" sz="2400" b="0" strike="noStrike" spc="-1" dirty="0">
+                <a:solidFill>
+                  <a:srgbClr val="000000"/>
+                </a:solidFill>
+                <a:latin typeface="Arial"/>
+                <a:ea typeface="DejaVu Sans"/>
+              </a:rPr>
+              <a:t>, </a:t>
+            </a:r>
+            <a:r>
+              <a:rPr lang="it-IT" sz="2400" b="0" strike="noStrike" spc="-1" dirty="0" err="1">
+                <a:solidFill>
+                  <a:srgbClr val="000000"/>
+                </a:solidFill>
+                <a:latin typeface="Arial"/>
+                <a:ea typeface="DejaVu Sans"/>
+              </a:rPr>
+              <a:t>etc</a:t>
+            </a:r>
+            <a:r>
+              <a:rPr lang="it-IT" sz="2400" b="0" strike="noStrike" spc="-1" dirty="0">
+                <a:solidFill>
+                  <a:srgbClr val="000000"/>
+                </a:solidFill>
+                <a:latin typeface="Arial"/>
+                <a:ea typeface="DejaVu Sans"/>
+              </a:rPr>
+              <a:t>…).</a:t>
+            </a:r>
+            <a:endParaRPr lang="it-IT" sz="2400" b="0" strike="noStrike" spc="-1" dirty="0">
               <a:latin typeface="Arial"/>
             </a:endParaRPr>
           </a:p>
           <a:p>
             <a:pPr marL="285840" indent="-283320">
               <a:lnSpc>
-                <a:spcPct val="115000"/>
+                <a:spcPct val="140000"/>
               </a:lnSpc>
               <a:buClr>
                 <a:srgbClr val="000000"/>
@@ -5976,23 +6606,83 @@
               <a:buChar char="•"/>
             </a:pPr>
             <a:r>
-              <a:rPr lang="it-IT" sz="2400" b="0" strike="noStrike" spc="-1">
-                <a:solidFill>
-                  <a:srgbClr val="000000"/>
-                </a:solidFill>
-                <a:latin typeface="Arial"/>
-                <a:ea typeface="DejaVu Sans"/>
-              </a:rPr>
-              <a:t>Indexes’ information (composition, details, etc…).</a:t>
-            </a:r>
-            <a:endParaRPr lang="it-IT" sz="2400" b="0" strike="noStrike" spc="-1">
+              <a:rPr lang="it-IT" sz="2400" b="0" strike="noStrike" spc="-1" dirty="0">
+                <a:solidFill>
+                  <a:srgbClr val="000000"/>
+                </a:solidFill>
+                <a:latin typeface="Arial"/>
+                <a:ea typeface="DejaVu Sans"/>
+              </a:rPr>
+              <a:t>Indexes’ information (</a:t>
+            </a:r>
+            <a:r>
+              <a:rPr lang="it-IT" sz="2400" b="0" strike="noStrike" spc="-1" dirty="0" err="1">
+                <a:solidFill>
+                  <a:srgbClr val="000000"/>
+                </a:solidFill>
+                <a:latin typeface="Arial"/>
+                <a:ea typeface="DejaVu Sans"/>
+              </a:rPr>
+              <a:t>composition</a:t>
+            </a:r>
+            <a:r>
+              <a:rPr lang="it-IT" sz="2400" b="0" strike="noStrike" spc="-1" dirty="0">
+                <a:solidFill>
+                  <a:srgbClr val="000000"/>
+                </a:solidFill>
+                <a:latin typeface="Arial"/>
+                <a:ea typeface="DejaVu Sans"/>
+              </a:rPr>
+              <a:t>, </a:t>
+            </a:r>
+            <a:r>
+              <a:rPr lang="it-IT" sz="2400" b="0" strike="noStrike" spc="-1" dirty="0" err="1">
+                <a:solidFill>
+                  <a:srgbClr val="000000"/>
+                </a:solidFill>
+                <a:latin typeface="Arial"/>
+                <a:ea typeface="DejaVu Sans"/>
+              </a:rPr>
+              <a:t>details</a:t>
+            </a:r>
+            <a:r>
+              <a:rPr lang="it-IT" sz="2400" b="0" strike="noStrike" spc="-1" dirty="0">
+                <a:solidFill>
+                  <a:srgbClr val="000000"/>
+                </a:solidFill>
+                <a:latin typeface="Arial"/>
+                <a:ea typeface="DejaVu Sans"/>
+              </a:rPr>
+              <a:t>, </a:t>
+            </a:r>
+            <a:r>
+              <a:rPr lang="it-IT" sz="2400" b="0" strike="noStrike" spc="-1" dirty="0" err="1">
+                <a:solidFill>
+                  <a:srgbClr val="000000"/>
+                </a:solidFill>
+                <a:latin typeface="Arial"/>
+                <a:ea typeface="DejaVu Sans"/>
+              </a:rPr>
+              <a:t>etc</a:t>
+            </a:r>
+            <a:r>
+              <a:rPr lang="it-IT" sz="2400" b="0" strike="noStrike" spc="-1" dirty="0">
+                <a:solidFill>
+                  <a:srgbClr val="000000"/>
+                </a:solidFill>
+                <a:latin typeface="Arial"/>
+                <a:ea typeface="DejaVu Sans"/>
+              </a:rPr>
+              <a:t>…).</a:t>
+            </a:r>
+            <a:endParaRPr lang="it-IT" sz="2400" b="0" strike="noStrike" spc="-1" dirty="0">
               <a:latin typeface="Arial"/>
             </a:endParaRPr>
           </a:p>
           <a:p>
             <a:pPr marL="285840" indent="-283320">
               <a:lnSpc>
-                <a:spcPct val="115000"/>
+                <a:spcPct val="140000"/>
               </a:lnSpc>
               <a:buClr>
                 <a:srgbClr val="000000"/>
@@ -6001,23 +6691,83 @@
               <a:buChar char="•"/>
             </a:pPr>
             <a:r>
-              <a:rPr lang="it-IT" sz="2400" b="0" strike="noStrike" spc="-1">
-                <a:solidFill>
-                  <a:srgbClr val="000000"/>
-                </a:solidFill>
-                <a:latin typeface="Arial"/>
-                <a:ea typeface="DejaVu Sans"/>
-              </a:rPr>
-              <a:t>Stock Portfolio’s information (name, composition, scope, etc…).</a:t>
-            </a:r>
-            <a:endParaRPr lang="it-IT" sz="2400" b="0" strike="noStrike" spc="-1">
+              <a:rPr lang="it-IT" sz="2400" b="0" strike="noStrike" spc="-1" dirty="0">
+                <a:solidFill>
+                  <a:srgbClr val="000000"/>
+                </a:solidFill>
+                <a:latin typeface="Arial"/>
+                <a:ea typeface="DejaVu Sans"/>
+              </a:rPr>
+              <a:t>Stock </a:t>
+            </a:r>
+            <a:r>
+              <a:rPr lang="it-IT" sz="2400" b="0" strike="noStrike" spc="-1" dirty="0" err="1">
+                <a:solidFill>
+                  <a:srgbClr val="000000"/>
+                </a:solidFill>
+                <a:latin typeface="Arial"/>
+                <a:ea typeface="DejaVu Sans"/>
+              </a:rPr>
+              <a:t>Portfolio’s</a:t>
+            </a:r>
+            <a:r>
+              <a:rPr lang="it-IT" sz="2400" b="0" strike="noStrike" spc="-1" dirty="0">
+                <a:solidFill>
+                  <a:srgbClr val="000000"/>
+                </a:solidFill>
+                <a:latin typeface="Arial"/>
+                <a:ea typeface="DejaVu Sans"/>
+              </a:rPr>
+              <a:t> information (name, </a:t>
+            </a:r>
+            <a:r>
+              <a:rPr lang="it-IT" sz="2400" b="0" strike="noStrike" spc="-1" dirty="0" err="1">
+                <a:solidFill>
+                  <a:srgbClr val="000000"/>
+                </a:solidFill>
+                <a:latin typeface="Arial"/>
+                <a:ea typeface="DejaVu Sans"/>
+              </a:rPr>
+              <a:t>composition</a:t>
+            </a:r>
+            <a:r>
+              <a:rPr lang="it-IT" sz="2400" b="0" strike="noStrike" spc="-1" dirty="0">
+                <a:solidFill>
+                  <a:srgbClr val="000000"/>
+                </a:solidFill>
+                <a:latin typeface="Arial"/>
+                <a:ea typeface="DejaVu Sans"/>
+              </a:rPr>
+              <a:t>, scope, </a:t>
+            </a:r>
+            <a:r>
+              <a:rPr lang="it-IT" sz="2400" b="0" strike="noStrike" spc="-1" dirty="0" err="1">
+                <a:solidFill>
+                  <a:srgbClr val="000000"/>
+                </a:solidFill>
+                <a:latin typeface="Arial"/>
+                <a:ea typeface="DejaVu Sans"/>
+              </a:rPr>
+              <a:t>etc</a:t>
+            </a:r>
+            <a:r>
+              <a:rPr lang="it-IT" sz="2400" b="0" strike="noStrike" spc="-1" dirty="0">
+                <a:solidFill>
+                  <a:srgbClr val="000000"/>
+                </a:solidFill>
+                <a:latin typeface="Arial"/>
+                <a:ea typeface="DejaVu Sans"/>
+              </a:rPr>
+              <a:t>…).</a:t>
+            </a:r>
+            <a:endParaRPr lang="it-IT" sz="2400" b="0" strike="noStrike" spc="-1" dirty="0">
               <a:latin typeface="Arial"/>
             </a:endParaRPr>
           </a:p>
           <a:p>
             <a:pPr marL="285840" indent="-283320">
               <a:lnSpc>
-                <a:spcPct val="115000"/>
+                <a:spcPct val="140000"/>
               </a:lnSpc>
               <a:buClr>
                 <a:srgbClr val="000000"/>
@@ -6026,16 +6776,56 @@
               <a:buChar char="•"/>
             </a:pPr>
             <a:r>
-              <a:rPr lang="it-IT" sz="2400" b="0" strike="noStrike" spc="-1">
-                <a:solidFill>
-                  <a:srgbClr val="000000"/>
-                </a:solidFill>
-                <a:latin typeface="Arial"/>
-                <a:ea typeface="DejaVu Sans"/>
-              </a:rPr>
-              <a:t>Stock portfolio simulation results.</a:t>
-            </a:r>
-            <a:endParaRPr lang="it-IT" sz="2400" b="0" strike="noStrike" spc="-1">
+              <a:rPr lang="it-IT" sz="2400" b="0" strike="noStrike" spc="-1" dirty="0">
+                <a:solidFill>
+                  <a:srgbClr val="000000"/>
+                </a:solidFill>
+                <a:latin typeface="Arial"/>
+                <a:ea typeface="DejaVu Sans"/>
+              </a:rPr>
+              <a:t>Stock portfolio </a:t>
+            </a:r>
+            <a:r>
+              <a:rPr lang="it-IT" sz="2400" b="0" strike="noStrike" spc="-1" dirty="0" err="1">
+                <a:solidFill>
+                  <a:srgbClr val="000000"/>
+                </a:solidFill>
+                <a:latin typeface="Arial"/>
+                <a:ea typeface="DejaVu Sans"/>
+              </a:rPr>
+              <a:t>simulation</a:t>
+            </a:r>
+            <a:r>
+              <a:rPr lang="it-IT" sz="2400" b="0" strike="noStrike" spc="-1" dirty="0">
+                <a:solidFill>
+                  <a:srgbClr val="000000"/>
+                </a:solidFill>
+                <a:latin typeface="Arial"/>
+                <a:ea typeface="DejaVu Sans"/>
+              </a:rPr>
+              <a:t> </a:t>
+            </a:r>
+            <a:r>
+              <a:rPr lang="it-IT" sz="2400" b="0" strike="noStrike" spc="-1" dirty="0" err="1">
+                <a:solidFill>
+                  <a:srgbClr val="000000"/>
+                </a:solidFill>
+                <a:latin typeface="Arial"/>
+                <a:ea typeface="DejaVu Sans"/>
+              </a:rPr>
+              <a:t>results</a:t>
+            </a:r>
+            <a:r>
+              <a:rPr lang="it-IT" sz="2400" b="0" strike="noStrike" spc="-1" dirty="0">
+                <a:solidFill>
+                  <a:srgbClr val="000000"/>
+                </a:solidFill>
+                <a:latin typeface="Arial"/>
+                <a:ea typeface="DejaVu Sans"/>
+              </a:rPr>
+              <a:t>.</a:t>
+            </a:r>
+            <a:endParaRPr lang="it-IT" sz="2400" b="0" strike="noStrike" spc="-1" dirty="0">
               <a:latin typeface="Arial"/>
             </a:endParaRPr>
           </a:p>
@@ -6045,7 +6835,7 @@
                 <a:spcPct val="115000"/>
               </a:lnSpc>
             </a:pPr>
-            <a:endParaRPr lang="it-IT" sz="2400" b="0" strike="noStrike" spc="-1">
+            <a:endParaRPr lang="it-IT" sz="2400" b="0" strike="noStrike" spc="-1" dirty="0">
               <a:latin typeface="Arial"/>
             </a:endParaRPr>
           </a:p>
@@ -6180,8 +6970,8 @@
         </p:nvSpPr>
         <p:spPr>
           <a:xfrm>
-            <a:off x="542520" y="1537560"/>
-            <a:ext cx="8086320" cy="3308040"/>
+            <a:off x="542520" y="1537559"/>
+            <a:ext cx="8086320" cy="4080815"/>
           </a:xfrm>
           <a:prstGeom prst="rect">
             <a:avLst/>
@@ -6218,21 +7008,81 @@
               <a:buChar char="•"/>
             </a:pPr>
             <a:r>
-              <a:rPr lang="it-IT" sz="2000" b="0" strike="noStrike" spc="-1">
-                <a:solidFill>
-                  <a:srgbClr val="000000"/>
-                </a:solidFill>
-                <a:latin typeface="Arial"/>
-                <a:ea typeface="DejaVu Sans"/>
-              </a:rPr>
-              <a:t>U.S. stock market stocks and ETFs historical data day by day, starting from 1971:</a:t>
-            </a:r>
-            <a:endParaRPr lang="it-IT" sz="2000" b="0" strike="noStrike" spc="-1">
-              <a:latin typeface="Arial"/>
-            </a:endParaRPr>
-          </a:p>
-          <a:p>
-            <a:pPr marL="648000" lvl="2" indent="-215280">
+              <a:rPr lang="it-IT" sz="2400" b="0" strike="noStrike" spc="-1" dirty="0">
+                <a:solidFill>
+                  <a:srgbClr val="000000"/>
+                </a:solidFill>
+                <a:latin typeface="Arial"/>
+                <a:ea typeface="DejaVu Sans"/>
+              </a:rPr>
+              <a:t>U.S. stock market stocks and </a:t>
+            </a:r>
+            <a:r>
+              <a:rPr lang="it-IT" sz="2400" b="0" strike="noStrike" spc="-1" dirty="0" err="1">
+                <a:solidFill>
+                  <a:srgbClr val="000000"/>
+                </a:solidFill>
+                <a:latin typeface="Arial"/>
+                <a:ea typeface="DejaVu Sans"/>
+              </a:rPr>
+              <a:t>ETFs</a:t>
+            </a:r>
+            <a:r>
+              <a:rPr lang="it-IT" sz="2400" b="0" strike="noStrike" spc="-1" dirty="0">
+                <a:solidFill>
+                  <a:srgbClr val="000000"/>
+                </a:solidFill>
+                <a:latin typeface="Arial"/>
+                <a:ea typeface="DejaVu Sans"/>
+              </a:rPr>
+              <a:t> </a:t>
+            </a:r>
+            <a:r>
+              <a:rPr lang="it-IT" sz="2400" b="0" strike="noStrike" spc="-1" dirty="0" err="1">
+                <a:solidFill>
+                  <a:srgbClr val="000000"/>
+                </a:solidFill>
+                <a:latin typeface="Arial"/>
+                <a:ea typeface="DejaVu Sans"/>
+              </a:rPr>
+              <a:t>historical</a:t>
+            </a:r>
+            <a:r>
+              <a:rPr lang="it-IT" sz="2400" b="0" strike="noStrike" spc="-1" dirty="0">
+                <a:solidFill>
+                  <a:srgbClr val="000000"/>
+                </a:solidFill>
+                <a:latin typeface="Arial"/>
+                <a:ea typeface="DejaVu Sans"/>
+              </a:rPr>
+              <a:t> data day by day, </a:t>
+            </a:r>
+            <a:r>
+              <a:rPr lang="it-IT" sz="2400" b="0" strike="noStrike" spc="-1" dirty="0" err="1">
+                <a:solidFill>
+                  <a:srgbClr val="000000"/>
+                </a:solidFill>
+                <a:latin typeface="Arial"/>
+                <a:ea typeface="DejaVu Sans"/>
+              </a:rPr>
+              <a:t>starting</a:t>
+            </a:r>
+            <a:r>
+              <a:rPr lang="it-IT" sz="2400" b="0" strike="noStrike" spc="-1" dirty="0">
+                <a:solidFill>
+                  <a:srgbClr val="000000"/>
+                </a:solidFill>
+                <a:latin typeface="Arial"/>
+                <a:ea typeface="DejaVu Sans"/>
+              </a:rPr>
+              <a:t> from 1971:</a:t>
+            </a:r>
+            <a:endParaRPr lang="it-IT" sz="2400" b="0" strike="noStrike" spc="-1" dirty="0">
+              <a:latin typeface="Arial"/>
+            </a:endParaRPr>
+          </a:p>
+          <a:p>
+            <a:pPr marL="775620" lvl="2" indent="-342900">
               <a:lnSpc>
                 <a:spcPct val="150000"/>
               </a:lnSpc>
@@ -6240,20 +7090,80 @@
                 <a:srgbClr val="000000"/>
               </a:buClr>
               <a:buSzPct val="45000"/>
-              <a:buFont typeface="Wingdings" charset="2"/>
-              <a:buChar char=""/>
+              <a:buFont typeface="Wingdings" panose="05000000000000000000" pitchFamily="2" charset="2"/>
+              <a:buChar char="q"/>
             </a:pPr>
             <a:r>
-              <a:rPr lang="it-IT" sz="2000" b="0" strike="noStrike" spc="-1">
-                <a:solidFill>
-                  <a:srgbClr val="000000"/>
-                </a:solidFill>
-                <a:latin typeface="Arial"/>
-                <a:ea typeface="DejaVu Sans"/>
-              </a:rPr>
-              <a:t>open, high, low, close and adjusted close prices.</a:t>
-            </a:r>
-            <a:endParaRPr lang="it-IT" sz="2000" b="0" strike="noStrike" spc="-1">
+              <a:rPr lang="it-IT" sz="2400" b="0" strike="noStrike" spc="-1" dirty="0">
+                <a:solidFill>
+                  <a:srgbClr val="000000"/>
+                </a:solidFill>
+                <a:latin typeface="Arial"/>
+                <a:ea typeface="DejaVu Sans"/>
+              </a:rPr>
+              <a:t>open, high, low, </a:t>
+            </a:r>
+            <a:r>
+              <a:rPr lang="it-IT" sz="2400" b="0" strike="noStrike" spc="-1" dirty="0" err="1">
+                <a:solidFill>
+                  <a:srgbClr val="000000"/>
+                </a:solidFill>
+                <a:latin typeface="Arial"/>
+                <a:ea typeface="DejaVu Sans"/>
+              </a:rPr>
+              <a:t>close</a:t>
+            </a:r>
+            <a:r>
+              <a:rPr lang="it-IT" sz="2400" b="0" strike="noStrike" spc="-1" dirty="0">
+                <a:solidFill>
+                  <a:srgbClr val="000000"/>
+                </a:solidFill>
+                <a:latin typeface="Arial"/>
+                <a:ea typeface="DejaVu Sans"/>
+              </a:rPr>
+              <a:t> and </a:t>
+            </a:r>
+            <a:r>
+              <a:rPr lang="it-IT" sz="2400" b="0" strike="noStrike" spc="-1" dirty="0" err="1">
+                <a:solidFill>
+                  <a:srgbClr val="000000"/>
+                </a:solidFill>
+                <a:latin typeface="Arial"/>
+                <a:ea typeface="DejaVu Sans"/>
+              </a:rPr>
+              <a:t>adjusted</a:t>
+            </a:r>
+            <a:r>
+              <a:rPr lang="it-IT" sz="2400" b="0" strike="noStrike" spc="-1" dirty="0">
+                <a:solidFill>
+                  <a:srgbClr val="000000"/>
+                </a:solidFill>
+                <a:latin typeface="Arial"/>
+                <a:ea typeface="DejaVu Sans"/>
+              </a:rPr>
+              <a:t> </a:t>
+            </a:r>
+            <a:r>
+              <a:rPr lang="it-IT" sz="2400" b="0" strike="noStrike" spc="-1" dirty="0" err="1">
+                <a:solidFill>
+                  <a:srgbClr val="000000"/>
+                </a:solidFill>
+                <a:latin typeface="Arial"/>
+                <a:ea typeface="DejaVu Sans"/>
+              </a:rPr>
+              <a:t>close</a:t>
+            </a:r>
+            <a:r>
+              <a:rPr lang="it-IT" sz="2400" b="0" strike="noStrike" spc="-1" dirty="0">
+                <a:solidFill>
+                  <a:srgbClr val="000000"/>
+                </a:solidFill>
+                <a:latin typeface="Arial"/>
+                <a:ea typeface="DejaVu Sans"/>
+              </a:rPr>
+              <a:t> prices.</a:t>
+            </a:r>
+            <a:endParaRPr lang="it-IT" sz="2400" b="0" strike="noStrike" spc="-1" dirty="0">
               <a:latin typeface="Arial"/>
             </a:endParaRPr>
           </a:p>
@@ -6269,16 +7179,36 @@
               <a:buChar char="•"/>
             </a:pPr>
             <a:r>
-              <a:rPr lang="it-IT" sz="2000" b="0" strike="noStrike" spc="-1">
-                <a:solidFill>
-                  <a:srgbClr val="000000"/>
-                </a:solidFill>
-                <a:latin typeface="Arial"/>
-                <a:ea typeface="DejaVu Sans"/>
-              </a:rPr>
-              <a:t>Market indexes computation.</a:t>
-            </a:r>
-            <a:endParaRPr lang="it-IT" sz="2000" b="0" strike="noStrike" spc="-1">
+              <a:rPr lang="it-IT" sz="2400" b="0" strike="noStrike" spc="-1" dirty="0">
+                <a:solidFill>
+                  <a:srgbClr val="000000"/>
+                </a:solidFill>
+                <a:latin typeface="Arial"/>
+                <a:ea typeface="DejaVu Sans"/>
+              </a:rPr>
+              <a:t>Market indexes </a:t>
+            </a:r>
+            <a:r>
+              <a:rPr lang="it-IT" sz="2400" b="0" strike="noStrike" spc="-1" dirty="0" err="1">
+                <a:solidFill>
+                  <a:srgbClr val="000000"/>
+                </a:solidFill>
+                <a:latin typeface="Arial"/>
+                <a:ea typeface="DejaVu Sans"/>
+              </a:rPr>
+              <a:t>computation</a:t>
+            </a:r>
+            <a:r>
+              <a:rPr lang="it-IT" sz="2400" b="0" strike="noStrike" spc="-1" dirty="0">
+                <a:solidFill>
+                  <a:srgbClr val="000000"/>
+                </a:solidFill>
+                <a:latin typeface="Arial"/>
+                <a:ea typeface="DejaVu Sans"/>
+              </a:rPr>
+              <a:t>.</a:t>
+            </a:r>
+            <a:endParaRPr lang="it-IT" sz="2400" b="0" strike="noStrike" spc="-1" dirty="0">
               <a:latin typeface="Arial"/>
             </a:endParaRPr>
           </a:p>
@@ -6294,16 +7224,96 @@
               <a:buChar char="•"/>
             </a:pPr>
             <a:r>
-              <a:rPr lang="it-IT" sz="2000" b="0" strike="noStrike" spc="-1">
-                <a:solidFill>
-                  <a:srgbClr val="000000"/>
-                </a:solidFill>
-                <a:latin typeface="Arial"/>
-                <a:ea typeface="DejaVu Sans"/>
-              </a:rPr>
-              <a:t>Fast and reliable data retrieval and statistics computation.</a:t>
-            </a:r>
-            <a:endParaRPr lang="it-IT" sz="2000" b="0" strike="noStrike" spc="-1">
+              <a:rPr lang="it-IT" sz="2400" b="0" strike="noStrike" spc="-1" dirty="0">
+                <a:solidFill>
+                  <a:srgbClr val="000000"/>
+                </a:solidFill>
+                <a:latin typeface="Arial"/>
+                <a:ea typeface="DejaVu Sans"/>
+              </a:rPr>
+              <a:t>Fast and </a:t>
+            </a:r>
+            <a:r>
+              <a:rPr lang="it-IT" sz="2400" b="0" strike="noStrike" spc="-1" dirty="0" err="1">
+                <a:solidFill>
+                  <a:srgbClr val="000000"/>
+                </a:solidFill>
+                <a:latin typeface="Arial"/>
+                <a:ea typeface="DejaVu Sans"/>
+              </a:rPr>
+              <a:t>reliable</a:t>
+            </a:r>
+            <a:r>
+              <a:rPr lang="it-IT" sz="2400" b="0" strike="noStrike" spc="-1" dirty="0">
+                <a:solidFill>
+                  <a:srgbClr val="000000"/>
+                </a:solidFill>
+                <a:latin typeface="Arial"/>
+                <a:ea typeface="DejaVu Sans"/>
+              </a:rPr>
+              <a:t> data </a:t>
+            </a:r>
+            <a:r>
+              <a:rPr lang="it-IT" sz="2400" b="0" strike="noStrike" spc="-1" dirty="0" err="1">
+                <a:solidFill>
+                  <a:srgbClr val="000000"/>
+                </a:solidFill>
+                <a:latin typeface="Arial"/>
+                <a:ea typeface="DejaVu Sans"/>
+              </a:rPr>
+              <a:t>retrieval</a:t>
+            </a:r>
+            <a:r>
+              <a:rPr lang="it-IT" sz="2400" b="0" strike="noStrike" spc="-1" dirty="0">
+                <a:solidFill>
+                  <a:srgbClr val="000000"/>
+                </a:solidFill>
+                <a:latin typeface="Arial"/>
+                <a:ea typeface="DejaVu Sans"/>
+              </a:rPr>
+              <a:t> and </a:t>
+            </a:r>
+            <a:r>
+              <a:rPr lang="it-IT" sz="2400" b="0" strike="noStrike" spc="-1" dirty="0" err="1">
+                <a:solidFill>
+                  <a:srgbClr val="000000"/>
+                </a:solidFill>
+                <a:latin typeface="Arial"/>
+                <a:ea typeface="DejaVu Sans"/>
+              </a:rPr>
+              <a:t>statistics</a:t>
+            </a:r>
+            <a:r>
+              <a:rPr lang="it-IT" sz="2400" b="0" strike="noStrike" spc="-1" dirty="0">
+                <a:solidFill>
+                  <a:srgbClr val="000000"/>
+                </a:solidFill>
+                <a:latin typeface="Arial"/>
+                <a:ea typeface="DejaVu Sans"/>
+              </a:rPr>
+              <a:t> </a:t>
+            </a:r>
+            <a:r>
+              <a:rPr lang="it-IT" sz="2400" b="0" strike="noStrike" spc="-1" dirty="0" err="1">
+                <a:solidFill>
+                  <a:srgbClr val="000000"/>
+                </a:solidFill>
+                <a:latin typeface="Arial"/>
+                <a:ea typeface="DejaVu Sans"/>
+              </a:rPr>
+              <a:t>computation</a:t>
+            </a:r>
+            <a:r>
+              <a:rPr lang="it-IT" sz="2400" b="0" strike="noStrike" spc="-1" dirty="0">
+                <a:solidFill>
+                  <a:srgbClr val="000000"/>
+                </a:solidFill>
+                <a:latin typeface="Arial"/>
+                <a:ea typeface="DejaVu Sans"/>
+              </a:rPr>
+              <a:t>.</a:t>
+            </a:r>
+            <a:endParaRPr lang="it-IT" sz="2400" b="0" strike="noStrike" spc="-1" dirty="0">
               <a:latin typeface="Arial"/>
             </a:endParaRPr>
           </a:p>

</xml_diff>